<commit_message>
add more info on assignments
</commit_message>
<xml_diff>
--- a/modules/week01/eds-213_intro.pptx
+++ b/modules/week01/eds-213_intro.pptx
@@ -13,8 +13,11 @@
     <p:sldId id="259" r:id="rId7"/>
     <p:sldId id="265" r:id="rId8"/>
     <p:sldId id="262" r:id="rId9"/>
-    <p:sldId id="263" r:id="rId10"/>
-    <p:sldId id="264" r:id="rId11"/>
+    <p:sldId id="266" r:id="rId10"/>
+    <p:sldId id="267" r:id="rId11"/>
+    <p:sldId id="268" r:id="rId12"/>
+    <p:sldId id="263" r:id="rId13"/>
+    <p:sldId id="264" r:id="rId14"/>
   </p:sldIdLst>
   <p:sldSz cx="12192000" cy="6858000"/>
   <p:notesSz cx="6858000" cy="9144000"/>
@@ -268,7 +271,7 @@
           <a:p>
             <a:fld id="{C094C93D-2F9A-5447-8FDC-662A08F74486}" type="datetimeFigureOut">
               <a:rPr lang="en-US" smtClean="0"/>
-              <a:t>4/1/25</a:t>
+              <a:t>4/3/25</a:t>
             </a:fld>
             <a:endParaRPr lang="en-US"/>
           </a:p>
@@ -466,7 +469,7 @@
           <a:p>
             <a:fld id="{C094C93D-2F9A-5447-8FDC-662A08F74486}" type="datetimeFigureOut">
               <a:rPr lang="en-US" smtClean="0"/>
-              <a:t>4/1/25</a:t>
+              <a:t>4/3/25</a:t>
             </a:fld>
             <a:endParaRPr lang="en-US"/>
           </a:p>
@@ -674,7 +677,7 @@
           <a:p>
             <a:fld id="{C094C93D-2F9A-5447-8FDC-662A08F74486}" type="datetimeFigureOut">
               <a:rPr lang="en-US" smtClean="0"/>
-              <a:t>4/1/25</a:t>
+              <a:t>4/3/25</a:t>
             </a:fld>
             <a:endParaRPr lang="en-US"/>
           </a:p>
@@ -872,7 +875,7 @@
           <a:p>
             <a:fld id="{C094C93D-2F9A-5447-8FDC-662A08F74486}" type="datetimeFigureOut">
               <a:rPr lang="en-US" smtClean="0"/>
-              <a:t>4/1/25</a:t>
+              <a:t>4/3/25</a:t>
             </a:fld>
             <a:endParaRPr lang="en-US"/>
           </a:p>
@@ -1147,7 +1150,7 @@
           <a:p>
             <a:fld id="{C094C93D-2F9A-5447-8FDC-662A08F74486}" type="datetimeFigureOut">
               <a:rPr lang="en-US" smtClean="0"/>
-              <a:t>4/1/25</a:t>
+              <a:t>4/3/25</a:t>
             </a:fld>
             <a:endParaRPr lang="en-US"/>
           </a:p>
@@ -1412,7 +1415,7 @@
           <a:p>
             <a:fld id="{C094C93D-2F9A-5447-8FDC-662A08F74486}" type="datetimeFigureOut">
               <a:rPr lang="en-US" smtClean="0"/>
-              <a:t>4/1/25</a:t>
+              <a:t>4/3/25</a:t>
             </a:fld>
             <a:endParaRPr lang="en-US"/>
           </a:p>
@@ -1824,7 +1827,7 @@
           <a:p>
             <a:fld id="{C094C93D-2F9A-5447-8FDC-662A08F74486}" type="datetimeFigureOut">
               <a:rPr lang="en-US" smtClean="0"/>
-              <a:t>4/1/25</a:t>
+              <a:t>4/3/25</a:t>
             </a:fld>
             <a:endParaRPr lang="en-US"/>
           </a:p>
@@ -1965,7 +1968,7 @@
           <a:p>
             <a:fld id="{C094C93D-2F9A-5447-8FDC-662A08F74486}" type="datetimeFigureOut">
               <a:rPr lang="en-US" smtClean="0"/>
-              <a:t>4/1/25</a:t>
+              <a:t>4/3/25</a:t>
             </a:fld>
             <a:endParaRPr lang="en-US"/>
           </a:p>
@@ -2078,7 +2081,7 @@
           <a:p>
             <a:fld id="{C094C93D-2F9A-5447-8FDC-662A08F74486}" type="datetimeFigureOut">
               <a:rPr lang="en-US" smtClean="0"/>
-              <a:t>4/1/25</a:t>
+              <a:t>4/3/25</a:t>
             </a:fld>
             <a:endParaRPr lang="en-US"/>
           </a:p>
@@ -2389,7 +2392,7 @@
           <a:p>
             <a:fld id="{C094C93D-2F9A-5447-8FDC-662A08F74486}" type="datetimeFigureOut">
               <a:rPr lang="en-US" smtClean="0"/>
-              <a:t>4/1/25</a:t>
+              <a:t>4/3/25</a:t>
             </a:fld>
             <a:endParaRPr lang="en-US"/>
           </a:p>
@@ -2677,7 +2680,7 @@
           <a:p>
             <a:fld id="{C094C93D-2F9A-5447-8FDC-662A08F74486}" type="datetimeFigureOut">
               <a:rPr lang="en-US" smtClean="0"/>
-              <a:t>4/1/25</a:t>
+              <a:t>4/3/25</a:t>
             </a:fld>
             <a:endParaRPr lang="en-US"/>
           </a:p>
@@ -2918,7 +2921,7 @@
           <a:p>
             <a:fld id="{C094C93D-2F9A-5447-8FDC-662A08F74486}" type="datetimeFigureOut">
               <a:rPr lang="en-US" smtClean="0"/>
-              <a:t>4/1/25</a:t>
+              <a:t>4/3/25</a:t>
             </a:fld>
             <a:endParaRPr lang="en-US"/>
           </a:p>
@@ -3517,6 +3520,416 @@
         <p:cNvPr id="1" name="">
           <a:extLst>
             <a:ext uri="{FF2B5EF4-FFF2-40B4-BE49-F238E27FC236}">
+              <a16:creationId xmlns:a16="http://schemas.microsoft.com/office/drawing/2014/main" id="{97502897-54BE-50EC-A6A2-4858570AF654}"/>
+            </a:ext>
+          </a:extLst>
+        </p:cNvPr>
+        <p:cNvGrpSpPr/>
+        <p:nvPr/>
+      </p:nvGrpSpPr>
+      <p:grpSpPr>
+        <a:xfrm>
+          <a:off x="0" y="0"/>
+          <a:ext cx="0" cy="0"/>
+          <a:chOff x="0" y="0"/>
+          <a:chExt cx="0" cy="0"/>
+        </a:xfrm>
+      </p:grpSpPr>
+      <p:sp>
+        <p:nvSpPr>
+          <p:cNvPr id="2" name="Title 1">
+            <a:extLst>
+              <a:ext uri="{FF2B5EF4-FFF2-40B4-BE49-F238E27FC236}">
+                <a16:creationId xmlns:a16="http://schemas.microsoft.com/office/drawing/2014/main" id="{1AC0D3B8-C7BE-9A91-C79D-C226422A23F1}"/>
+              </a:ext>
+            </a:extLst>
+          </p:cNvPr>
+          <p:cNvSpPr>
+            <a:spLocks noGrp="1"/>
+          </p:cNvSpPr>
+          <p:nvPr>
+            <p:ph type="title"/>
+          </p:nvPr>
+        </p:nvSpPr>
+        <p:spPr/>
+        <p:txBody>
+          <a:bodyPr/>
+          <a:lstStyle/>
+          <a:p>
+            <a:r>
+              <a:rPr lang="en-US" dirty="0">
+                <a:solidFill>
+                  <a:srgbClr val="002060"/>
+                </a:solidFill>
+              </a:rPr>
+              <a:t>Assessment</a:t>
+            </a:r>
+          </a:p>
+        </p:txBody>
+      </p:sp>
+      <p:sp>
+        <p:nvSpPr>
+          <p:cNvPr id="6" name="Content Placeholder 5">
+            <a:extLst>
+              <a:ext uri="{FF2B5EF4-FFF2-40B4-BE49-F238E27FC236}">
+                <a16:creationId xmlns:a16="http://schemas.microsoft.com/office/drawing/2014/main" id="{E61ACD74-0580-C68A-CAE3-377BC204B291}"/>
+              </a:ext>
+            </a:extLst>
+          </p:cNvPr>
+          <p:cNvSpPr>
+            <a:spLocks noGrp="1"/>
+          </p:cNvSpPr>
+          <p:nvPr>
+            <p:ph idx="1"/>
+          </p:nvPr>
+        </p:nvSpPr>
+        <p:spPr/>
+        <p:txBody>
+          <a:bodyPr/>
+          <a:lstStyle/>
+          <a:p>
+            <a:pPr marL="0" indent="0">
+              <a:buNone/>
+            </a:pPr>
+            <a:r>
+              <a:rPr lang="en-US" sz="3200" dirty="0"/>
+              <a:t>4 Main criteria:</a:t>
+            </a:r>
+            <a:br>
+              <a:rPr lang="en-US" sz="3200" dirty="0"/>
+            </a:br>
+            <a:endParaRPr lang="en-US" sz="3200" dirty="0"/>
+          </a:p>
+          <a:p>
+            <a:pPr lvl="1">
+              <a:lnSpc>
+                <a:spcPct val="100000"/>
+              </a:lnSpc>
+            </a:pPr>
+            <a:r>
+              <a:rPr lang="en-US" sz="3200" dirty="0"/>
+              <a:t>Technical concepts (database, data modeling)</a:t>
+            </a:r>
+          </a:p>
+          <a:p>
+            <a:pPr lvl="1">
+              <a:lnSpc>
+                <a:spcPct val="100000"/>
+              </a:lnSpc>
+            </a:pPr>
+            <a:r>
+              <a:rPr lang="en-US" sz="3200" dirty="0"/>
+              <a:t>Code</a:t>
+            </a:r>
+          </a:p>
+          <a:p>
+            <a:pPr lvl="1">
+              <a:lnSpc>
+                <a:spcPct val="100000"/>
+              </a:lnSpc>
+            </a:pPr>
+            <a:r>
+              <a:rPr lang="en-US" sz="3200" dirty="0"/>
+              <a:t>Documentation</a:t>
+            </a:r>
+          </a:p>
+          <a:p>
+            <a:pPr lvl="1">
+              <a:lnSpc>
+                <a:spcPct val="100000"/>
+              </a:lnSpc>
+            </a:pPr>
+            <a:r>
+              <a:rPr lang="en-US" sz="3200" dirty="0"/>
+              <a:t>Reproducibility</a:t>
+            </a:r>
+          </a:p>
+          <a:p>
+            <a:endParaRPr lang="en-US" dirty="0"/>
+          </a:p>
+        </p:txBody>
+      </p:sp>
+    </p:spTree>
+    <p:extLst>
+      <p:ext uri="{BB962C8B-B14F-4D97-AF65-F5344CB8AC3E}">
+        <p14:creationId xmlns:p14="http://schemas.microsoft.com/office/powerpoint/2010/main" val="4122199566"/>
+      </p:ext>
+    </p:extLst>
+  </p:cSld>
+  <p:clrMapOvr>
+    <a:masterClrMapping/>
+  </p:clrMapOvr>
+</p:sld>
+</file>
+
+<file path=ppt/slides/slide11.xml><?xml version="1.0" encoding="utf-8"?>
+<p:sld xmlns:a="http://schemas.openxmlformats.org/drawingml/2006/main" xmlns:r="http://schemas.openxmlformats.org/officeDocument/2006/relationships" xmlns:p="http://schemas.openxmlformats.org/presentationml/2006/main">
+  <p:cSld>
+    <p:spTree>
+      <p:nvGrpSpPr>
+        <p:cNvPr id="1" name="">
+          <a:extLst>
+            <a:ext uri="{FF2B5EF4-FFF2-40B4-BE49-F238E27FC236}">
+              <a16:creationId xmlns:a16="http://schemas.microsoft.com/office/drawing/2014/main" id="{E5C16E2D-4717-C51B-410E-22E443E0BFC4}"/>
+            </a:ext>
+          </a:extLst>
+        </p:cNvPr>
+        <p:cNvGrpSpPr/>
+        <p:nvPr/>
+      </p:nvGrpSpPr>
+      <p:grpSpPr>
+        <a:xfrm>
+          <a:off x="0" y="0"/>
+          <a:ext cx="0" cy="0"/>
+          <a:chOff x="0" y="0"/>
+          <a:chExt cx="0" cy="0"/>
+        </a:xfrm>
+      </p:grpSpPr>
+      <p:sp>
+        <p:nvSpPr>
+          <p:cNvPr id="2" name="Title 1">
+            <a:extLst>
+              <a:ext uri="{FF2B5EF4-FFF2-40B4-BE49-F238E27FC236}">
+                <a16:creationId xmlns:a16="http://schemas.microsoft.com/office/drawing/2014/main" id="{ABE5877A-33F7-7467-E704-25075739627E}"/>
+              </a:ext>
+            </a:extLst>
+          </p:cNvPr>
+          <p:cNvSpPr>
+            <a:spLocks noGrp="1"/>
+          </p:cNvSpPr>
+          <p:nvPr>
+            <p:ph type="title"/>
+          </p:nvPr>
+        </p:nvSpPr>
+        <p:spPr/>
+        <p:txBody>
+          <a:bodyPr/>
+          <a:lstStyle/>
+          <a:p>
+            <a:r>
+              <a:rPr lang="en-US" dirty="0">
+                <a:solidFill>
+                  <a:srgbClr val="002060"/>
+                </a:solidFill>
+              </a:rPr>
+              <a:t>Assessment</a:t>
+            </a:r>
+          </a:p>
+        </p:txBody>
+      </p:sp>
+      <p:sp>
+        <p:nvSpPr>
+          <p:cNvPr id="6" name="Content Placeholder 5">
+            <a:extLst>
+              <a:ext uri="{FF2B5EF4-FFF2-40B4-BE49-F238E27FC236}">
+                <a16:creationId xmlns:a16="http://schemas.microsoft.com/office/drawing/2014/main" id="{3930EFC4-F014-12E1-B1D1-775CF75B4D6C}"/>
+              </a:ext>
+            </a:extLst>
+          </p:cNvPr>
+          <p:cNvSpPr>
+            <a:spLocks noGrp="1"/>
+          </p:cNvSpPr>
+          <p:nvPr>
+            <p:ph idx="1"/>
+          </p:nvPr>
+        </p:nvSpPr>
+        <p:spPr/>
+        <p:txBody>
+          <a:bodyPr/>
+          <a:lstStyle/>
+          <a:p>
+            <a:pPr marL="0" indent="0">
+              <a:buNone/>
+            </a:pPr>
+            <a:r>
+              <a:rPr lang="en-US" sz="3200" dirty="0"/>
+              <a:t>Weekly assignments will be managed via Canvas</a:t>
+            </a:r>
+          </a:p>
+          <a:p>
+            <a:pPr>
+              <a:buFontTx/>
+              <a:buChar char="-"/>
+            </a:pPr>
+            <a:r>
+              <a:rPr lang="en-US" sz="3200" dirty="0"/>
+              <a:t>Available by 5PM on Thursdays</a:t>
+            </a:r>
+          </a:p>
+          <a:p>
+            <a:pPr>
+              <a:buFontTx/>
+              <a:buChar char="-"/>
+            </a:pPr>
+            <a:r>
+              <a:rPr lang="en-US" sz="3200" dirty="0"/>
+              <a:t>Due by next Wednesdays 11:59PM</a:t>
+            </a:r>
+          </a:p>
+          <a:p>
+            <a:pPr>
+              <a:buFontTx/>
+              <a:buChar char="-"/>
+            </a:pPr>
+            <a:r>
+              <a:rPr lang="en-US" sz="3200" dirty="0"/>
+              <a:t>3 days to resubmit after receiving feedback</a:t>
+            </a:r>
+          </a:p>
+          <a:p>
+            <a:pPr marL="0" indent="0">
+              <a:buNone/>
+            </a:pPr>
+            <a:endParaRPr lang="en-US" sz="3200" dirty="0"/>
+          </a:p>
+        </p:txBody>
+      </p:sp>
+    </p:spTree>
+    <p:extLst>
+      <p:ext uri="{BB962C8B-B14F-4D97-AF65-F5344CB8AC3E}">
+        <p14:creationId xmlns:p14="http://schemas.microsoft.com/office/powerpoint/2010/main" val="634306876"/>
+      </p:ext>
+    </p:extLst>
+  </p:cSld>
+  <p:clrMapOvr>
+    <a:masterClrMapping/>
+  </p:clrMapOvr>
+</p:sld>
+</file>
+
+<file path=ppt/slides/slide12.xml><?xml version="1.0" encoding="utf-8"?>
+<p:sld xmlns:a="http://schemas.openxmlformats.org/drawingml/2006/main" xmlns:r="http://schemas.openxmlformats.org/officeDocument/2006/relationships" xmlns:p="http://schemas.openxmlformats.org/presentationml/2006/main">
+  <p:cSld>
+    <p:spTree>
+      <p:nvGrpSpPr>
+        <p:cNvPr id="1" name=""/>
+        <p:cNvGrpSpPr/>
+        <p:nvPr/>
+      </p:nvGrpSpPr>
+      <p:grpSpPr>
+        <a:xfrm>
+          <a:off x="0" y="0"/>
+          <a:ext cx="0" cy="0"/>
+          <a:chOff x="0" y="0"/>
+          <a:chExt cx="0" cy="0"/>
+        </a:xfrm>
+      </p:grpSpPr>
+      <p:sp>
+        <p:nvSpPr>
+          <p:cNvPr id="2" name="Title 1">
+            <a:extLst>
+              <a:ext uri="{FF2B5EF4-FFF2-40B4-BE49-F238E27FC236}">
+                <a16:creationId xmlns:a16="http://schemas.microsoft.com/office/drawing/2014/main" id="{BD9D57C8-0AE8-9B2D-958E-73D4FFFD8E5F}"/>
+              </a:ext>
+            </a:extLst>
+          </p:cNvPr>
+          <p:cNvSpPr>
+            <a:spLocks noGrp="1"/>
+          </p:cNvSpPr>
+          <p:nvPr>
+            <p:ph type="title"/>
+          </p:nvPr>
+        </p:nvSpPr>
+        <p:spPr/>
+        <p:txBody>
+          <a:bodyPr/>
+          <a:lstStyle/>
+          <a:p>
+            <a:r>
+              <a:rPr lang="en-US" dirty="0">
+                <a:solidFill>
+                  <a:srgbClr val="002060"/>
+                </a:solidFill>
+              </a:rPr>
+              <a:t>AI Assistant Tools </a:t>
+            </a:r>
+            <a:endParaRPr lang="en-US" dirty="0"/>
+          </a:p>
+        </p:txBody>
+      </p:sp>
+      <p:sp>
+        <p:nvSpPr>
+          <p:cNvPr id="3" name="Content Placeholder 2">
+            <a:extLst>
+              <a:ext uri="{FF2B5EF4-FFF2-40B4-BE49-F238E27FC236}">
+                <a16:creationId xmlns:a16="http://schemas.microsoft.com/office/drawing/2014/main" id="{C85F1BE2-9AFE-698D-FF46-095969922792}"/>
+              </a:ext>
+            </a:extLst>
+          </p:cNvPr>
+          <p:cNvSpPr>
+            <a:spLocks noGrp="1"/>
+          </p:cNvSpPr>
+          <p:nvPr>
+            <p:ph idx="1"/>
+          </p:nvPr>
+        </p:nvSpPr>
+        <p:spPr/>
+        <p:txBody>
+          <a:bodyPr/>
+          <a:lstStyle/>
+          <a:p>
+            <a:pPr marL="0" indent="0">
+              <a:buNone/>
+            </a:pPr>
+            <a:r>
+              <a:rPr lang="en-US" i="1" dirty="0"/>
+              <a:t>Materials (written or otherwise) submitted to fulfill academic requirements must represent a student’s efforts unless otherwise permitted by an instructor    </a:t>
+            </a:r>
+            <a:r>
+              <a:rPr lang="en-US" sz="2000" dirty="0">
+                <a:hlinkClick r:id="rId2"/>
+              </a:rPr>
+              <a:t>Student Guide to Academic Integrity</a:t>
+            </a:r>
+            <a:br>
+              <a:rPr lang="en-US" sz="2000" dirty="0"/>
+            </a:br>
+            <a:endParaRPr lang="en-US" sz="2000" i="1" dirty="0"/>
+          </a:p>
+          <a:p>
+            <a:r>
+              <a:rPr lang="en-US" dirty="0"/>
+              <a:t>Disclaim the use of any coding assistant or LLMs (such as ChatGPT) </a:t>
+            </a:r>
+          </a:p>
+          <a:p>
+            <a:r>
+              <a:rPr lang="en-US" dirty="0"/>
+              <a:t>Understand every line of code that is submitted as part of the assignments</a:t>
+            </a:r>
+          </a:p>
+          <a:p>
+            <a:pPr marL="0" indent="0">
+              <a:buNone/>
+            </a:pPr>
+            <a:r>
+              <a:rPr lang="en-US" b="1" i="1" dirty="0"/>
+              <a:t> =&gt; refrain from the use of AI tools and keep to practicing your skills and favoring peer-to-peer learning</a:t>
+            </a:r>
+          </a:p>
+        </p:txBody>
+      </p:sp>
+    </p:spTree>
+    <p:extLst>
+      <p:ext uri="{BB962C8B-B14F-4D97-AF65-F5344CB8AC3E}">
+        <p14:creationId xmlns:p14="http://schemas.microsoft.com/office/powerpoint/2010/main" val="4291811760"/>
+      </p:ext>
+    </p:extLst>
+  </p:cSld>
+  <p:clrMapOvr>
+    <a:masterClrMapping/>
+  </p:clrMapOvr>
+</p:sld>
+</file>
+
+<file path=ppt/slides/slide13.xml><?xml version="1.0" encoding="utf-8"?>
+<p:sld xmlns:a="http://schemas.openxmlformats.org/drawingml/2006/main" xmlns:r="http://schemas.openxmlformats.org/officeDocument/2006/relationships" xmlns:p="http://schemas.openxmlformats.org/presentationml/2006/main">
+  <p:cSld>
+    <p:spTree>
+      <p:nvGrpSpPr>
+        <p:cNvPr id="1" name="">
+          <a:extLst>
+            <a:ext uri="{FF2B5EF4-FFF2-40B4-BE49-F238E27FC236}">
               <a16:creationId xmlns:a16="http://schemas.microsoft.com/office/drawing/2014/main" id="{F82A9FED-F493-3685-54EC-9999E1F6CE89}"/>
             </a:ext>
           </a:extLst>
@@ -5338,7 +5751,13 @@
   <p:cSld>
     <p:spTree>
       <p:nvGrpSpPr>
-        <p:cNvPr id="1" name=""/>
+        <p:cNvPr id="1" name="">
+          <a:extLst>
+            <a:ext uri="{FF2B5EF4-FFF2-40B4-BE49-F238E27FC236}">
+              <a16:creationId xmlns:a16="http://schemas.microsoft.com/office/drawing/2014/main" id="{CB0F8E8C-3FC9-6849-D243-9EB38FDC010F}"/>
+            </a:ext>
+          </a:extLst>
+        </p:cNvPr>
         <p:cNvGrpSpPr/>
         <p:nvPr/>
       </p:nvGrpSpPr>
@@ -5355,7 +5774,7 @@
           <p:cNvPr id="2" name="Title 1">
             <a:extLst>
               <a:ext uri="{FF2B5EF4-FFF2-40B4-BE49-F238E27FC236}">
-                <a16:creationId xmlns:a16="http://schemas.microsoft.com/office/drawing/2014/main" id="{BD9D57C8-0AE8-9B2D-958E-73D4FFFD8E5F}"/>
+                <a16:creationId xmlns:a16="http://schemas.microsoft.com/office/drawing/2014/main" id="{8B785528-3FE0-6384-6DC2-4F38F55F19EA}"/>
               </a:ext>
             </a:extLst>
           </p:cNvPr>
@@ -5377,70 +5796,2753 @@
                   <a:srgbClr val="002060"/>
                 </a:solidFill>
               </a:rPr>
-              <a:t>AI Assistant Tools </a:t>
-            </a:r>
-            <a:endParaRPr lang="en-US" dirty="0"/>
+              <a:t>Assessment</a:t>
+            </a:r>
           </a:p>
         </p:txBody>
       </p:sp>
+      <p:graphicFrame>
+        <p:nvGraphicFramePr>
+          <p:cNvPr id="4" name="Content Placeholder 3">
+            <a:extLst>
+              <a:ext uri="{FF2B5EF4-FFF2-40B4-BE49-F238E27FC236}">
+                <a16:creationId xmlns:a16="http://schemas.microsoft.com/office/drawing/2014/main" id="{7A8241B8-BCF4-D1CF-2ECB-715308782461}"/>
+              </a:ext>
+            </a:extLst>
+          </p:cNvPr>
+          <p:cNvGraphicFramePr>
+            <a:graphicFrameLocks noGrp="1"/>
+          </p:cNvGraphicFramePr>
+          <p:nvPr>
+            <p:ph idx="1"/>
+            <p:extLst>
+              <p:ext uri="{D42A27DB-BD31-4B8C-83A1-F6EECF244321}">
+                <p14:modId xmlns:p14="http://schemas.microsoft.com/office/powerpoint/2010/main" val="1705808468"/>
+              </p:ext>
+            </p:extLst>
+          </p:nvPr>
+        </p:nvGraphicFramePr>
+        <p:xfrm>
+          <a:off x="4648200" y="838200"/>
+          <a:ext cx="5257800" cy="4351335"/>
+        </p:xfrm>
+        <a:graphic>
+          <a:graphicData uri="http://schemas.openxmlformats.org/drawingml/2006/table">
+            <a:tbl>
+              <a:tblPr/>
+              <a:tblGrid>
+                <a:gridCol w="1162050">
+                  <a:extLst>
+                    <a:ext uri="{9D8B030D-6E8A-4147-A177-3AD203B41FA5}">
+                      <a16:colId xmlns:a16="http://schemas.microsoft.com/office/drawing/2014/main" val="3810534210"/>
+                    </a:ext>
+                  </a:extLst>
+                </a:gridCol>
+                <a:gridCol w="3257550">
+                  <a:extLst>
+                    <a:ext uri="{9D8B030D-6E8A-4147-A177-3AD203B41FA5}">
+                      <a16:colId xmlns:a16="http://schemas.microsoft.com/office/drawing/2014/main" val="2989509016"/>
+                    </a:ext>
+                  </a:extLst>
+                </a:gridCol>
+                <a:gridCol w="838200">
+                  <a:extLst>
+                    <a:ext uri="{9D8B030D-6E8A-4147-A177-3AD203B41FA5}">
+                      <a16:colId xmlns:a16="http://schemas.microsoft.com/office/drawing/2014/main" val="1346928536"/>
+                    </a:ext>
+                  </a:extLst>
+                </a:gridCol>
+              </a:tblGrid>
+              <a:tr h="297341">
+                <a:tc>
+                  <a:txBody>
+                    <a:bodyPr/>
+                    <a:lstStyle/>
+                    <a:p>
+                      <a:pPr algn="r" rtl="0" fontAlgn="b"/>
+                      <a:r>
+                        <a:rPr lang="en-US" sz="1700" b="1" dirty="0">
+                          <a:effectLst/>
+                        </a:rPr>
+                        <a:t>Week</a:t>
+                      </a:r>
+                    </a:p>
+                  </a:txBody>
+                  <a:tcPr marL="27196" marR="27196" marT="18131" marB="18131" anchor="b">
+                    <a:lnL w="12700" cap="flat" cmpd="sng" algn="ctr">
+                      <a:solidFill>
+                        <a:schemeClr val="tx1"/>
+                      </a:solidFill>
+                      <a:prstDash val="solid"/>
+                      <a:round/>
+                      <a:headEnd type="none" w="med" len="med"/>
+                      <a:tailEnd type="none" w="med" len="med"/>
+                    </a:lnL>
+                    <a:lnR w="9525" cap="flat" cmpd="sng" algn="ctr">
+                      <a:noFill/>
+                      <a:prstDash val="solid"/>
+                      <a:round/>
+                      <a:headEnd type="none" w="med" len="med"/>
+                      <a:tailEnd type="none" w="med" len="med"/>
+                    </a:lnR>
+                    <a:lnT w="12700" cap="flat" cmpd="sng" algn="ctr">
+                      <a:solidFill>
+                        <a:schemeClr val="tx1"/>
+                      </a:solidFill>
+                      <a:prstDash val="solid"/>
+                      <a:round/>
+                      <a:headEnd type="none" w="med" len="med"/>
+                      <a:tailEnd type="none" w="med" len="med"/>
+                    </a:lnT>
+                    <a:lnB w="12700" cap="flat" cmpd="sng" algn="ctr">
+                      <a:solidFill>
+                        <a:schemeClr val="tx1"/>
+                      </a:solidFill>
+                      <a:prstDash val="solid"/>
+                      <a:round/>
+                      <a:headEnd type="none" w="med" len="med"/>
+                      <a:tailEnd type="none" w="med" len="med"/>
+                    </a:lnB>
+                    <a:lnTlToBr w="12700" cmpd="sng">
+                      <a:noFill/>
+                      <a:prstDash val="solid"/>
+                    </a:lnTlToBr>
+                    <a:lnBlToTr w="12700" cmpd="sng">
+                      <a:noFill/>
+                      <a:prstDash val="solid"/>
+                    </a:lnBlToTr>
+                    <a:solidFill>
+                      <a:srgbClr val="D9EAD3"/>
+                    </a:solidFill>
+                  </a:tcPr>
+                </a:tc>
+                <a:tc>
+                  <a:txBody>
+                    <a:bodyPr/>
+                    <a:lstStyle/>
+                    <a:p>
+                      <a:pPr rtl="0" fontAlgn="b"/>
+                      <a:r>
+                        <a:rPr lang="en-US" sz="1700" b="1" dirty="0">
+                          <a:effectLst/>
+                        </a:rPr>
+                        <a:t>Assignment</a:t>
+                      </a:r>
+                    </a:p>
+                  </a:txBody>
+                  <a:tcPr marL="27196" marR="27196" marT="18131" marB="18131" anchor="b">
+                    <a:lnL w="9525" cap="flat" cmpd="sng" algn="ctr">
+                      <a:noFill/>
+                      <a:prstDash val="solid"/>
+                      <a:round/>
+                      <a:headEnd type="none" w="med" len="med"/>
+                      <a:tailEnd type="none" w="med" len="med"/>
+                    </a:lnL>
+                    <a:lnR w="9525" cap="flat" cmpd="sng" algn="ctr">
+                      <a:noFill/>
+                      <a:prstDash val="solid"/>
+                      <a:round/>
+                      <a:headEnd type="none" w="med" len="med"/>
+                      <a:tailEnd type="none" w="med" len="med"/>
+                    </a:lnR>
+                    <a:lnT w="12700" cap="flat" cmpd="sng" algn="ctr">
+                      <a:solidFill>
+                        <a:schemeClr val="tx1"/>
+                      </a:solidFill>
+                      <a:prstDash val="solid"/>
+                      <a:round/>
+                      <a:headEnd type="none" w="med" len="med"/>
+                      <a:tailEnd type="none" w="med" len="med"/>
+                    </a:lnT>
+                    <a:lnB w="12700" cap="flat" cmpd="sng" algn="ctr">
+                      <a:solidFill>
+                        <a:schemeClr val="tx1"/>
+                      </a:solidFill>
+                      <a:prstDash val="solid"/>
+                      <a:round/>
+                      <a:headEnd type="none" w="med" len="med"/>
+                      <a:tailEnd type="none" w="med" len="med"/>
+                    </a:lnB>
+                    <a:lnTlToBr w="12700" cmpd="sng">
+                      <a:noFill/>
+                      <a:prstDash val="solid"/>
+                    </a:lnTlToBr>
+                    <a:lnBlToTr w="12700" cmpd="sng">
+                      <a:noFill/>
+                      <a:prstDash val="solid"/>
+                    </a:lnBlToTr>
+                    <a:solidFill>
+                      <a:srgbClr val="D9EAD3"/>
+                    </a:solidFill>
+                  </a:tcPr>
+                </a:tc>
+                <a:tc>
+                  <a:txBody>
+                    <a:bodyPr/>
+                    <a:lstStyle/>
+                    <a:p>
+                      <a:pPr rtl="0" fontAlgn="b"/>
+                      <a:r>
+                        <a:rPr lang="en-US" sz="1700" b="1" dirty="0">
+                          <a:effectLst/>
+                        </a:rPr>
+                        <a:t>Points</a:t>
+                      </a:r>
+                    </a:p>
+                  </a:txBody>
+                  <a:tcPr marL="27196" marR="27196" marT="18131" marB="18131" anchor="b">
+                    <a:lnL w="9525" cap="flat" cmpd="sng" algn="ctr">
+                      <a:noFill/>
+                      <a:prstDash val="solid"/>
+                      <a:round/>
+                      <a:headEnd type="none" w="med" len="med"/>
+                      <a:tailEnd type="none" w="med" len="med"/>
+                    </a:lnL>
+                    <a:lnR w="12700" cap="flat" cmpd="sng" algn="ctr">
+                      <a:solidFill>
+                        <a:schemeClr val="tx1"/>
+                      </a:solidFill>
+                      <a:prstDash val="solid"/>
+                      <a:round/>
+                      <a:headEnd type="none" w="med" len="med"/>
+                      <a:tailEnd type="none" w="med" len="med"/>
+                    </a:lnR>
+                    <a:lnT w="12700" cap="flat" cmpd="sng" algn="ctr">
+                      <a:solidFill>
+                        <a:schemeClr val="tx1"/>
+                      </a:solidFill>
+                      <a:prstDash val="solid"/>
+                      <a:round/>
+                      <a:headEnd type="none" w="med" len="med"/>
+                      <a:tailEnd type="none" w="med" len="med"/>
+                    </a:lnT>
+                    <a:lnB w="12700" cap="flat" cmpd="sng" algn="ctr">
+                      <a:solidFill>
+                        <a:schemeClr val="tx1"/>
+                      </a:solidFill>
+                      <a:prstDash val="solid"/>
+                      <a:round/>
+                      <a:headEnd type="none" w="med" len="med"/>
+                      <a:tailEnd type="none" w="med" len="med"/>
+                    </a:lnB>
+                    <a:lnTlToBr w="12700" cmpd="sng">
+                      <a:noFill/>
+                      <a:prstDash val="solid"/>
+                    </a:lnTlToBr>
+                    <a:lnBlToTr w="12700" cmpd="sng">
+                      <a:noFill/>
+                      <a:prstDash val="solid"/>
+                    </a:lnBlToTr>
+                    <a:solidFill>
+                      <a:srgbClr val="D9EAD3"/>
+                    </a:solidFill>
+                  </a:tcPr>
+                </a:tc>
+                <a:extLst>
+                  <a:ext uri="{0D108BD9-81ED-4DB2-BD59-A6C34878D82A}">
+                    <a16:rowId xmlns:a16="http://schemas.microsoft.com/office/drawing/2014/main" val="827076816"/>
+                  </a:ext>
+                </a:extLst>
+              </a:tr>
+              <a:tr h="297341">
+                <a:tc>
+                  <a:txBody>
+                    <a:bodyPr/>
+                    <a:lstStyle/>
+                    <a:p>
+                      <a:pPr algn="r" rtl="0" fontAlgn="b"/>
+                      <a:r>
+                        <a:rPr lang="en-US" sz="1700">
+                          <a:effectLst/>
+                        </a:rPr>
+                        <a:t>1</a:t>
+                      </a:r>
+                    </a:p>
+                  </a:txBody>
+                  <a:tcPr marL="27196" marR="27196" marT="18131" marB="18131" anchor="b">
+                    <a:lnL w="12700" cap="flat" cmpd="sng" algn="ctr">
+                      <a:solidFill>
+                        <a:schemeClr val="tx1"/>
+                      </a:solidFill>
+                      <a:prstDash val="solid"/>
+                      <a:round/>
+                      <a:headEnd type="none" w="med" len="med"/>
+                      <a:tailEnd type="none" w="med" len="med"/>
+                    </a:lnL>
+                    <a:lnR w="9525" cap="flat" cmpd="sng" algn="ctr">
+                      <a:noFill/>
+                      <a:prstDash val="solid"/>
+                      <a:round/>
+                      <a:headEnd type="none" w="med" len="med"/>
+                      <a:tailEnd type="none" w="med" len="med"/>
+                    </a:lnR>
+                    <a:lnT w="12700" cap="flat" cmpd="sng" algn="ctr">
+                      <a:solidFill>
+                        <a:schemeClr val="tx1"/>
+                      </a:solidFill>
+                      <a:prstDash val="solid"/>
+                      <a:round/>
+                      <a:headEnd type="none" w="med" len="med"/>
+                      <a:tailEnd type="none" w="med" len="med"/>
+                    </a:lnT>
+                    <a:lnB w="12700" cap="flat" cmpd="sng" algn="ctr">
+                      <a:solidFill>
+                        <a:schemeClr val="tx1"/>
+                      </a:solidFill>
+                      <a:prstDash val="solid"/>
+                      <a:round/>
+                      <a:headEnd type="none" w="med" len="med"/>
+                      <a:tailEnd type="none" w="med" len="med"/>
+                    </a:lnB>
+                    <a:lnTlToBr w="12700" cmpd="sng">
+                      <a:noFill/>
+                      <a:prstDash val="solid"/>
+                    </a:lnTlToBr>
+                    <a:lnBlToTr w="12700" cmpd="sng">
+                      <a:noFill/>
+                      <a:prstDash val="solid"/>
+                    </a:lnBlToTr>
+                    <a:noFill/>
+                  </a:tcPr>
+                </a:tc>
+                <a:tc>
+                  <a:txBody>
+                    <a:bodyPr/>
+                    <a:lstStyle/>
+                    <a:p>
+                      <a:pPr rtl="0" fontAlgn="b"/>
+                      <a:r>
+                        <a:rPr lang="en-US" sz="1700">
+                          <a:effectLst/>
+                        </a:rPr>
+                        <a:t>Data Modelling</a:t>
+                      </a:r>
+                    </a:p>
+                  </a:txBody>
+                  <a:tcPr marL="27196" marR="27196" marT="18131" marB="18131" anchor="b">
+                    <a:lnL w="9525" cap="flat" cmpd="sng" algn="ctr">
+                      <a:noFill/>
+                      <a:prstDash val="solid"/>
+                      <a:round/>
+                      <a:headEnd type="none" w="med" len="med"/>
+                      <a:tailEnd type="none" w="med" len="med"/>
+                    </a:lnL>
+                    <a:lnR w="9525" cap="flat" cmpd="sng" algn="ctr">
+                      <a:noFill/>
+                      <a:prstDash val="solid"/>
+                      <a:round/>
+                      <a:headEnd type="none" w="med" len="med"/>
+                      <a:tailEnd type="none" w="med" len="med"/>
+                    </a:lnR>
+                    <a:lnT w="12700" cap="flat" cmpd="sng" algn="ctr">
+                      <a:solidFill>
+                        <a:schemeClr val="tx1"/>
+                      </a:solidFill>
+                      <a:prstDash val="solid"/>
+                      <a:round/>
+                      <a:headEnd type="none" w="med" len="med"/>
+                      <a:tailEnd type="none" w="med" len="med"/>
+                    </a:lnT>
+                    <a:lnB w="12700" cap="flat" cmpd="sng" algn="ctr">
+                      <a:solidFill>
+                        <a:schemeClr val="tx1"/>
+                      </a:solidFill>
+                      <a:prstDash val="solid"/>
+                      <a:round/>
+                      <a:headEnd type="none" w="med" len="med"/>
+                      <a:tailEnd type="none" w="med" len="med"/>
+                    </a:lnB>
+                    <a:lnTlToBr w="12700" cmpd="sng">
+                      <a:noFill/>
+                      <a:prstDash val="solid"/>
+                    </a:lnTlToBr>
+                    <a:lnBlToTr w="12700" cmpd="sng">
+                      <a:noFill/>
+                      <a:prstDash val="solid"/>
+                    </a:lnBlToTr>
+                    <a:noFill/>
+                  </a:tcPr>
+                </a:tc>
+                <a:tc>
+                  <a:txBody>
+                    <a:bodyPr/>
+                    <a:lstStyle/>
+                    <a:p>
+                      <a:pPr algn="r" rtl="0" fontAlgn="b"/>
+                      <a:r>
+                        <a:rPr lang="en-US" sz="1700">
+                          <a:effectLst/>
+                        </a:rPr>
+                        <a:t>100</a:t>
+                      </a:r>
+                    </a:p>
+                  </a:txBody>
+                  <a:tcPr marL="27196" marR="27196" marT="18131" marB="18131" anchor="b">
+                    <a:lnL w="9525" cap="flat" cmpd="sng" algn="ctr">
+                      <a:noFill/>
+                      <a:prstDash val="solid"/>
+                      <a:round/>
+                      <a:headEnd type="none" w="med" len="med"/>
+                      <a:tailEnd type="none" w="med" len="med"/>
+                    </a:lnL>
+                    <a:lnR w="12700" cap="flat" cmpd="sng" algn="ctr">
+                      <a:solidFill>
+                        <a:schemeClr val="tx1"/>
+                      </a:solidFill>
+                      <a:prstDash val="solid"/>
+                      <a:round/>
+                      <a:headEnd type="none" w="med" len="med"/>
+                      <a:tailEnd type="none" w="med" len="med"/>
+                    </a:lnR>
+                    <a:lnT w="12700" cap="flat" cmpd="sng" algn="ctr">
+                      <a:solidFill>
+                        <a:schemeClr val="tx1"/>
+                      </a:solidFill>
+                      <a:prstDash val="solid"/>
+                      <a:round/>
+                      <a:headEnd type="none" w="med" len="med"/>
+                      <a:tailEnd type="none" w="med" len="med"/>
+                    </a:lnT>
+                    <a:lnB w="12700" cap="flat" cmpd="sng" algn="ctr">
+                      <a:solidFill>
+                        <a:schemeClr val="tx1"/>
+                      </a:solidFill>
+                      <a:prstDash val="solid"/>
+                      <a:round/>
+                      <a:headEnd type="none" w="med" len="med"/>
+                      <a:tailEnd type="none" w="med" len="med"/>
+                    </a:lnB>
+                    <a:lnTlToBr w="12700" cmpd="sng">
+                      <a:noFill/>
+                      <a:prstDash val="solid"/>
+                    </a:lnTlToBr>
+                    <a:lnBlToTr w="12700" cmpd="sng">
+                      <a:noFill/>
+                      <a:prstDash val="solid"/>
+                    </a:lnBlToTr>
+                    <a:noFill/>
+                  </a:tcPr>
+                </a:tc>
+                <a:extLst>
+                  <a:ext uri="{0D108BD9-81ED-4DB2-BD59-A6C34878D82A}">
+                    <a16:rowId xmlns:a16="http://schemas.microsoft.com/office/drawing/2014/main" val="3676020966"/>
+                  </a:ext>
+                </a:extLst>
+              </a:tr>
+              <a:tr h="297341">
+                <a:tc>
+                  <a:txBody>
+                    <a:bodyPr/>
+                    <a:lstStyle/>
+                    <a:p>
+                      <a:pPr algn="r" rtl="0" fontAlgn="b"/>
+                      <a:r>
+                        <a:rPr lang="en-US" sz="1700">
+                          <a:effectLst/>
+                        </a:rPr>
+                        <a:t>2</a:t>
+                      </a:r>
+                    </a:p>
+                  </a:txBody>
+                  <a:tcPr marL="27196" marR="27196" marT="18131" marB="18131" anchor="b">
+                    <a:lnL w="12700" cap="flat" cmpd="sng" algn="ctr">
+                      <a:solidFill>
+                        <a:schemeClr val="tx1"/>
+                      </a:solidFill>
+                      <a:prstDash val="solid"/>
+                      <a:round/>
+                      <a:headEnd type="none" w="med" len="med"/>
+                      <a:tailEnd type="none" w="med" len="med"/>
+                    </a:lnL>
+                    <a:lnR w="9525" cap="flat" cmpd="sng" algn="ctr">
+                      <a:noFill/>
+                      <a:prstDash val="solid"/>
+                      <a:round/>
+                      <a:headEnd type="none" w="med" len="med"/>
+                      <a:tailEnd type="none" w="med" len="med"/>
+                    </a:lnR>
+                    <a:lnT w="12700" cap="flat" cmpd="sng" algn="ctr">
+                      <a:solidFill>
+                        <a:schemeClr val="tx1"/>
+                      </a:solidFill>
+                      <a:prstDash val="solid"/>
+                      <a:round/>
+                      <a:headEnd type="none" w="med" len="med"/>
+                      <a:tailEnd type="none" w="med" len="med"/>
+                    </a:lnT>
+                    <a:lnB w="12700" cap="flat" cmpd="sng" algn="ctr">
+                      <a:solidFill>
+                        <a:schemeClr val="tx1"/>
+                      </a:solidFill>
+                      <a:prstDash val="solid"/>
+                      <a:round/>
+                      <a:headEnd type="none" w="med" len="med"/>
+                      <a:tailEnd type="none" w="med" len="med"/>
+                    </a:lnB>
+                    <a:lnTlToBr w="12700" cmpd="sng">
+                      <a:noFill/>
+                      <a:prstDash val="solid"/>
+                    </a:lnTlToBr>
+                    <a:lnBlToTr w="12700" cmpd="sng">
+                      <a:noFill/>
+                      <a:prstDash val="solid"/>
+                    </a:lnBlToTr>
+                    <a:noFill/>
+                  </a:tcPr>
+                </a:tc>
+                <a:tc>
+                  <a:txBody>
+                    <a:bodyPr/>
+                    <a:lstStyle/>
+                    <a:p>
+                      <a:pPr rtl="0" fontAlgn="b"/>
+                      <a:r>
+                        <a:rPr lang="en-US" sz="1700">
+                          <a:effectLst/>
+                        </a:rPr>
+                        <a:t>Data Cleaning</a:t>
+                      </a:r>
+                    </a:p>
+                  </a:txBody>
+                  <a:tcPr marL="27196" marR="27196" marT="18131" marB="18131" anchor="b">
+                    <a:lnL w="9525" cap="flat" cmpd="sng" algn="ctr">
+                      <a:noFill/>
+                      <a:prstDash val="solid"/>
+                      <a:round/>
+                      <a:headEnd type="none" w="med" len="med"/>
+                      <a:tailEnd type="none" w="med" len="med"/>
+                    </a:lnL>
+                    <a:lnR w="9525" cap="flat" cmpd="sng" algn="ctr">
+                      <a:noFill/>
+                      <a:prstDash val="solid"/>
+                      <a:round/>
+                      <a:headEnd type="none" w="med" len="med"/>
+                      <a:tailEnd type="none" w="med" len="med"/>
+                    </a:lnR>
+                    <a:lnT w="12700" cap="flat" cmpd="sng" algn="ctr">
+                      <a:solidFill>
+                        <a:schemeClr val="tx1"/>
+                      </a:solidFill>
+                      <a:prstDash val="solid"/>
+                      <a:round/>
+                      <a:headEnd type="none" w="med" len="med"/>
+                      <a:tailEnd type="none" w="med" len="med"/>
+                    </a:lnT>
+                    <a:lnB w="12700" cap="flat" cmpd="sng" algn="ctr">
+                      <a:solidFill>
+                        <a:schemeClr val="tx1"/>
+                      </a:solidFill>
+                      <a:prstDash val="solid"/>
+                      <a:round/>
+                      <a:headEnd type="none" w="med" len="med"/>
+                      <a:tailEnd type="none" w="med" len="med"/>
+                    </a:lnB>
+                    <a:lnTlToBr w="12700" cmpd="sng">
+                      <a:noFill/>
+                      <a:prstDash val="solid"/>
+                    </a:lnTlToBr>
+                    <a:lnBlToTr w="12700" cmpd="sng">
+                      <a:noFill/>
+                      <a:prstDash val="solid"/>
+                    </a:lnBlToTr>
+                    <a:noFill/>
+                  </a:tcPr>
+                </a:tc>
+                <a:tc>
+                  <a:txBody>
+                    <a:bodyPr/>
+                    <a:lstStyle/>
+                    <a:p>
+                      <a:pPr algn="r" rtl="0" fontAlgn="b"/>
+                      <a:r>
+                        <a:rPr lang="en-US" sz="1700">
+                          <a:effectLst/>
+                        </a:rPr>
+                        <a:t>100</a:t>
+                      </a:r>
+                    </a:p>
+                  </a:txBody>
+                  <a:tcPr marL="27196" marR="27196" marT="18131" marB="18131" anchor="b">
+                    <a:lnL w="9525" cap="flat" cmpd="sng" algn="ctr">
+                      <a:noFill/>
+                      <a:prstDash val="solid"/>
+                      <a:round/>
+                      <a:headEnd type="none" w="med" len="med"/>
+                      <a:tailEnd type="none" w="med" len="med"/>
+                    </a:lnL>
+                    <a:lnR w="12700" cap="flat" cmpd="sng" algn="ctr">
+                      <a:solidFill>
+                        <a:schemeClr val="tx1"/>
+                      </a:solidFill>
+                      <a:prstDash val="solid"/>
+                      <a:round/>
+                      <a:headEnd type="none" w="med" len="med"/>
+                      <a:tailEnd type="none" w="med" len="med"/>
+                    </a:lnR>
+                    <a:lnT w="12700" cap="flat" cmpd="sng" algn="ctr">
+                      <a:solidFill>
+                        <a:schemeClr val="tx1"/>
+                      </a:solidFill>
+                      <a:prstDash val="solid"/>
+                      <a:round/>
+                      <a:headEnd type="none" w="med" len="med"/>
+                      <a:tailEnd type="none" w="med" len="med"/>
+                    </a:lnT>
+                    <a:lnB w="12700" cap="flat" cmpd="sng" algn="ctr">
+                      <a:solidFill>
+                        <a:schemeClr val="tx1"/>
+                      </a:solidFill>
+                      <a:prstDash val="solid"/>
+                      <a:round/>
+                      <a:headEnd type="none" w="med" len="med"/>
+                      <a:tailEnd type="none" w="med" len="med"/>
+                    </a:lnB>
+                    <a:lnTlToBr w="12700" cmpd="sng">
+                      <a:noFill/>
+                      <a:prstDash val="solid"/>
+                    </a:lnTlToBr>
+                    <a:lnBlToTr w="12700" cmpd="sng">
+                      <a:noFill/>
+                      <a:prstDash val="solid"/>
+                    </a:lnBlToTr>
+                    <a:noFill/>
+                  </a:tcPr>
+                </a:tc>
+                <a:extLst>
+                  <a:ext uri="{0D108BD9-81ED-4DB2-BD59-A6C34878D82A}">
+                    <a16:rowId xmlns:a16="http://schemas.microsoft.com/office/drawing/2014/main" val="2806413544"/>
+                  </a:ext>
+                </a:extLst>
+              </a:tr>
+              <a:tr h="297341">
+                <a:tc>
+                  <a:txBody>
+                    <a:bodyPr/>
+                    <a:lstStyle/>
+                    <a:p>
+                      <a:pPr algn="r" rtl="0" fontAlgn="b"/>
+                      <a:r>
+                        <a:rPr lang="en-US" sz="1700">
+                          <a:effectLst/>
+                        </a:rPr>
+                        <a:t>3</a:t>
+                      </a:r>
+                    </a:p>
+                  </a:txBody>
+                  <a:tcPr marL="27196" marR="27196" marT="18131" marB="18131" anchor="b">
+                    <a:lnL w="12700" cap="flat" cmpd="sng" algn="ctr">
+                      <a:solidFill>
+                        <a:schemeClr val="tx1"/>
+                      </a:solidFill>
+                      <a:prstDash val="solid"/>
+                      <a:round/>
+                      <a:headEnd type="none" w="med" len="med"/>
+                      <a:tailEnd type="none" w="med" len="med"/>
+                    </a:lnL>
+                    <a:lnR w="9525" cap="flat" cmpd="sng" algn="ctr">
+                      <a:noFill/>
+                      <a:prstDash val="solid"/>
+                      <a:round/>
+                      <a:headEnd type="none" w="med" len="med"/>
+                      <a:tailEnd type="none" w="med" len="med"/>
+                    </a:lnR>
+                    <a:lnT w="12700" cap="flat" cmpd="sng" algn="ctr">
+                      <a:solidFill>
+                        <a:schemeClr val="tx1"/>
+                      </a:solidFill>
+                      <a:prstDash val="solid"/>
+                      <a:round/>
+                      <a:headEnd type="none" w="med" len="med"/>
+                      <a:tailEnd type="none" w="med" len="med"/>
+                    </a:lnT>
+                    <a:lnB w="12700" cap="flat" cmpd="sng" algn="ctr">
+                      <a:solidFill>
+                        <a:schemeClr val="tx1"/>
+                      </a:solidFill>
+                      <a:prstDash val="solid"/>
+                      <a:round/>
+                      <a:headEnd type="none" w="med" len="med"/>
+                      <a:tailEnd type="none" w="med" len="med"/>
+                    </a:lnB>
+                    <a:lnTlToBr w="12700" cmpd="sng">
+                      <a:noFill/>
+                      <a:prstDash val="solid"/>
+                    </a:lnTlToBr>
+                    <a:lnBlToTr w="12700" cmpd="sng">
+                      <a:noFill/>
+                      <a:prstDash val="solid"/>
+                    </a:lnBlToTr>
+                    <a:noFill/>
+                  </a:tcPr>
+                </a:tc>
+                <a:tc>
+                  <a:txBody>
+                    <a:bodyPr/>
+                    <a:lstStyle/>
+                    <a:p>
+                      <a:pPr rtl="0" fontAlgn="b"/>
+                      <a:r>
+                        <a:rPr lang="en-US" sz="1700">
+                          <a:effectLst/>
+                        </a:rPr>
+                        <a:t>SQL query part I</a:t>
+                      </a:r>
+                    </a:p>
+                  </a:txBody>
+                  <a:tcPr marL="27196" marR="27196" marT="18131" marB="18131" anchor="b">
+                    <a:lnL w="9525" cap="flat" cmpd="sng" algn="ctr">
+                      <a:noFill/>
+                      <a:prstDash val="solid"/>
+                      <a:round/>
+                      <a:headEnd type="none" w="med" len="med"/>
+                      <a:tailEnd type="none" w="med" len="med"/>
+                    </a:lnL>
+                    <a:lnR w="9525" cap="flat" cmpd="sng" algn="ctr">
+                      <a:noFill/>
+                      <a:prstDash val="solid"/>
+                      <a:round/>
+                      <a:headEnd type="none" w="med" len="med"/>
+                      <a:tailEnd type="none" w="med" len="med"/>
+                    </a:lnR>
+                    <a:lnT w="12700" cap="flat" cmpd="sng" algn="ctr">
+                      <a:solidFill>
+                        <a:schemeClr val="tx1"/>
+                      </a:solidFill>
+                      <a:prstDash val="solid"/>
+                      <a:round/>
+                      <a:headEnd type="none" w="med" len="med"/>
+                      <a:tailEnd type="none" w="med" len="med"/>
+                    </a:lnT>
+                    <a:lnB w="12700" cap="flat" cmpd="sng" algn="ctr">
+                      <a:solidFill>
+                        <a:schemeClr val="tx1"/>
+                      </a:solidFill>
+                      <a:prstDash val="solid"/>
+                      <a:round/>
+                      <a:headEnd type="none" w="med" len="med"/>
+                      <a:tailEnd type="none" w="med" len="med"/>
+                    </a:lnB>
+                    <a:lnTlToBr w="12700" cmpd="sng">
+                      <a:noFill/>
+                      <a:prstDash val="solid"/>
+                    </a:lnTlToBr>
+                    <a:lnBlToTr w="12700" cmpd="sng">
+                      <a:noFill/>
+                      <a:prstDash val="solid"/>
+                    </a:lnBlToTr>
+                    <a:noFill/>
+                  </a:tcPr>
+                </a:tc>
+                <a:tc>
+                  <a:txBody>
+                    <a:bodyPr/>
+                    <a:lstStyle/>
+                    <a:p>
+                      <a:pPr algn="r" rtl="0" fontAlgn="b"/>
+                      <a:r>
+                        <a:rPr lang="en-US" sz="1700" dirty="0">
+                          <a:effectLst/>
+                        </a:rPr>
+                        <a:t>120</a:t>
+                      </a:r>
+                    </a:p>
+                  </a:txBody>
+                  <a:tcPr marL="27196" marR="27196" marT="18131" marB="18131" anchor="b">
+                    <a:lnL w="9525" cap="flat" cmpd="sng" algn="ctr">
+                      <a:noFill/>
+                      <a:prstDash val="solid"/>
+                      <a:round/>
+                      <a:headEnd type="none" w="med" len="med"/>
+                      <a:tailEnd type="none" w="med" len="med"/>
+                    </a:lnL>
+                    <a:lnR w="12700" cap="flat" cmpd="sng" algn="ctr">
+                      <a:solidFill>
+                        <a:schemeClr val="tx1"/>
+                      </a:solidFill>
+                      <a:prstDash val="solid"/>
+                      <a:round/>
+                      <a:headEnd type="none" w="med" len="med"/>
+                      <a:tailEnd type="none" w="med" len="med"/>
+                    </a:lnR>
+                    <a:lnT w="12700" cap="flat" cmpd="sng" algn="ctr">
+                      <a:solidFill>
+                        <a:schemeClr val="tx1"/>
+                      </a:solidFill>
+                      <a:prstDash val="solid"/>
+                      <a:round/>
+                      <a:headEnd type="none" w="med" len="med"/>
+                      <a:tailEnd type="none" w="med" len="med"/>
+                    </a:lnT>
+                    <a:lnB w="12700" cap="flat" cmpd="sng" algn="ctr">
+                      <a:solidFill>
+                        <a:schemeClr val="tx1"/>
+                      </a:solidFill>
+                      <a:prstDash val="solid"/>
+                      <a:round/>
+                      <a:headEnd type="none" w="med" len="med"/>
+                      <a:tailEnd type="none" w="med" len="med"/>
+                    </a:lnB>
+                    <a:lnTlToBr w="12700" cmpd="sng">
+                      <a:noFill/>
+                      <a:prstDash val="solid"/>
+                    </a:lnTlToBr>
+                    <a:lnBlToTr w="12700" cmpd="sng">
+                      <a:noFill/>
+                      <a:prstDash val="solid"/>
+                    </a:lnBlToTr>
+                    <a:noFill/>
+                  </a:tcPr>
+                </a:tc>
+                <a:extLst>
+                  <a:ext uri="{0D108BD9-81ED-4DB2-BD59-A6C34878D82A}">
+                    <a16:rowId xmlns:a16="http://schemas.microsoft.com/office/drawing/2014/main" val="1579598922"/>
+                  </a:ext>
+                </a:extLst>
+              </a:tr>
+              <a:tr h="297341">
+                <a:tc>
+                  <a:txBody>
+                    <a:bodyPr/>
+                    <a:lstStyle/>
+                    <a:p>
+                      <a:pPr algn="r" rtl="0" fontAlgn="b"/>
+                      <a:r>
+                        <a:rPr lang="en-US" sz="1700">
+                          <a:effectLst/>
+                        </a:rPr>
+                        <a:t>4</a:t>
+                      </a:r>
+                    </a:p>
+                  </a:txBody>
+                  <a:tcPr marL="27196" marR="27196" marT="18131" marB="18131" anchor="b">
+                    <a:lnL w="12700" cap="flat" cmpd="sng" algn="ctr">
+                      <a:solidFill>
+                        <a:schemeClr val="tx1"/>
+                      </a:solidFill>
+                      <a:prstDash val="solid"/>
+                      <a:round/>
+                      <a:headEnd type="none" w="med" len="med"/>
+                      <a:tailEnd type="none" w="med" len="med"/>
+                    </a:lnL>
+                    <a:lnR w="9525" cap="flat" cmpd="sng" algn="ctr">
+                      <a:noFill/>
+                      <a:prstDash val="solid"/>
+                      <a:round/>
+                      <a:headEnd type="none" w="med" len="med"/>
+                      <a:tailEnd type="none" w="med" len="med"/>
+                    </a:lnR>
+                    <a:lnT w="12700" cap="flat" cmpd="sng" algn="ctr">
+                      <a:solidFill>
+                        <a:schemeClr val="tx1"/>
+                      </a:solidFill>
+                      <a:prstDash val="solid"/>
+                      <a:round/>
+                      <a:headEnd type="none" w="med" len="med"/>
+                      <a:tailEnd type="none" w="med" len="med"/>
+                    </a:lnT>
+                    <a:lnB w="12700" cap="flat" cmpd="sng" algn="ctr">
+                      <a:solidFill>
+                        <a:schemeClr val="tx1"/>
+                      </a:solidFill>
+                      <a:prstDash val="solid"/>
+                      <a:round/>
+                      <a:headEnd type="none" w="med" len="med"/>
+                      <a:tailEnd type="none" w="med" len="med"/>
+                    </a:lnB>
+                    <a:lnTlToBr w="12700" cmpd="sng">
+                      <a:noFill/>
+                      <a:prstDash val="solid"/>
+                    </a:lnTlToBr>
+                    <a:lnBlToTr w="12700" cmpd="sng">
+                      <a:noFill/>
+                      <a:prstDash val="solid"/>
+                    </a:lnBlToTr>
+                    <a:noFill/>
+                  </a:tcPr>
+                </a:tc>
+                <a:tc>
+                  <a:txBody>
+                    <a:bodyPr/>
+                    <a:lstStyle/>
+                    <a:p>
+                      <a:pPr rtl="0" fontAlgn="b"/>
+                      <a:r>
+                        <a:rPr lang="en-US" sz="1700">
+                          <a:effectLst/>
+                        </a:rPr>
+                        <a:t>SQL query part II</a:t>
+                      </a:r>
+                    </a:p>
+                  </a:txBody>
+                  <a:tcPr marL="27196" marR="27196" marT="18131" marB="18131" anchor="b">
+                    <a:lnL w="9525" cap="flat" cmpd="sng" algn="ctr">
+                      <a:noFill/>
+                      <a:prstDash val="solid"/>
+                      <a:round/>
+                      <a:headEnd type="none" w="med" len="med"/>
+                      <a:tailEnd type="none" w="med" len="med"/>
+                    </a:lnL>
+                    <a:lnR w="9525" cap="flat" cmpd="sng" algn="ctr">
+                      <a:noFill/>
+                      <a:prstDash val="solid"/>
+                      <a:round/>
+                      <a:headEnd type="none" w="med" len="med"/>
+                      <a:tailEnd type="none" w="med" len="med"/>
+                    </a:lnR>
+                    <a:lnT w="12700" cap="flat" cmpd="sng" algn="ctr">
+                      <a:solidFill>
+                        <a:schemeClr val="tx1"/>
+                      </a:solidFill>
+                      <a:prstDash val="solid"/>
+                      <a:round/>
+                      <a:headEnd type="none" w="med" len="med"/>
+                      <a:tailEnd type="none" w="med" len="med"/>
+                    </a:lnT>
+                    <a:lnB w="12700" cap="flat" cmpd="sng" algn="ctr">
+                      <a:solidFill>
+                        <a:schemeClr val="tx1"/>
+                      </a:solidFill>
+                      <a:prstDash val="solid"/>
+                      <a:round/>
+                      <a:headEnd type="none" w="med" len="med"/>
+                      <a:tailEnd type="none" w="med" len="med"/>
+                    </a:lnB>
+                    <a:lnTlToBr w="12700" cmpd="sng">
+                      <a:noFill/>
+                      <a:prstDash val="solid"/>
+                    </a:lnTlToBr>
+                    <a:lnBlToTr w="12700" cmpd="sng">
+                      <a:noFill/>
+                      <a:prstDash val="solid"/>
+                    </a:lnBlToTr>
+                    <a:noFill/>
+                  </a:tcPr>
+                </a:tc>
+                <a:tc>
+                  <a:txBody>
+                    <a:bodyPr/>
+                    <a:lstStyle/>
+                    <a:p>
+                      <a:pPr algn="r" rtl="0" fontAlgn="b"/>
+                      <a:r>
+                        <a:rPr lang="en-US" sz="1700" dirty="0">
+                          <a:effectLst/>
+                        </a:rPr>
+                        <a:t>110</a:t>
+                      </a:r>
+                    </a:p>
+                  </a:txBody>
+                  <a:tcPr marL="27196" marR="27196" marT="18131" marB="18131" anchor="b">
+                    <a:lnL w="9525" cap="flat" cmpd="sng" algn="ctr">
+                      <a:noFill/>
+                      <a:prstDash val="solid"/>
+                      <a:round/>
+                      <a:headEnd type="none" w="med" len="med"/>
+                      <a:tailEnd type="none" w="med" len="med"/>
+                    </a:lnL>
+                    <a:lnR w="12700" cap="flat" cmpd="sng" algn="ctr">
+                      <a:solidFill>
+                        <a:schemeClr val="tx1"/>
+                      </a:solidFill>
+                      <a:prstDash val="solid"/>
+                      <a:round/>
+                      <a:headEnd type="none" w="med" len="med"/>
+                      <a:tailEnd type="none" w="med" len="med"/>
+                    </a:lnR>
+                    <a:lnT w="12700" cap="flat" cmpd="sng" algn="ctr">
+                      <a:solidFill>
+                        <a:schemeClr val="tx1"/>
+                      </a:solidFill>
+                      <a:prstDash val="solid"/>
+                      <a:round/>
+                      <a:headEnd type="none" w="med" len="med"/>
+                      <a:tailEnd type="none" w="med" len="med"/>
+                    </a:lnT>
+                    <a:lnB w="12700" cap="flat" cmpd="sng" algn="ctr">
+                      <a:solidFill>
+                        <a:schemeClr val="tx1"/>
+                      </a:solidFill>
+                      <a:prstDash val="solid"/>
+                      <a:round/>
+                      <a:headEnd type="none" w="med" len="med"/>
+                      <a:tailEnd type="none" w="med" len="med"/>
+                    </a:lnB>
+                    <a:lnTlToBr w="12700" cmpd="sng">
+                      <a:noFill/>
+                      <a:prstDash val="solid"/>
+                    </a:lnTlToBr>
+                    <a:lnBlToTr w="12700" cmpd="sng">
+                      <a:noFill/>
+                      <a:prstDash val="solid"/>
+                    </a:lnBlToTr>
+                    <a:noFill/>
+                  </a:tcPr>
+                </a:tc>
+                <a:extLst>
+                  <a:ext uri="{0D108BD9-81ED-4DB2-BD59-A6C34878D82A}">
+                    <a16:rowId xmlns:a16="http://schemas.microsoft.com/office/drawing/2014/main" val="3893492520"/>
+                  </a:ext>
+                </a:extLst>
+              </a:tr>
+              <a:tr h="297341">
+                <a:tc>
+                  <a:txBody>
+                    <a:bodyPr/>
+                    <a:lstStyle/>
+                    <a:p>
+                      <a:pPr algn="r" rtl="0" fontAlgn="b"/>
+                      <a:r>
+                        <a:rPr lang="en-US" sz="1700">
+                          <a:effectLst/>
+                        </a:rPr>
+                        <a:t>5</a:t>
+                      </a:r>
+                    </a:p>
+                  </a:txBody>
+                  <a:tcPr marL="27196" marR="27196" marT="18131" marB="18131" anchor="b">
+                    <a:lnL w="12700" cap="flat" cmpd="sng" algn="ctr">
+                      <a:solidFill>
+                        <a:schemeClr val="tx1"/>
+                      </a:solidFill>
+                      <a:prstDash val="solid"/>
+                      <a:round/>
+                      <a:headEnd type="none" w="med" len="med"/>
+                      <a:tailEnd type="none" w="med" len="med"/>
+                    </a:lnL>
+                    <a:lnR w="9525" cap="flat" cmpd="sng" algn="ctr">
+                      <a:noFill/>
+                      <a:prstDash val="solid"/>
+                      <a:round/>
+                      <a:headEnd type="none" w="med" len="med"/>
+                      <a:tailEnd type="none" w="med" len="med"/>
+                    </a:lnR>
+                    <a:lnT w="12700" cap="flat" cmpd="sng" algn="ctr">
+                      <a:solidFill>
+                        <a:schemeClr val="tx1"/>
+                      </a:solidFill>
+                      <a:prstDash val="solid"/>
+                      <a:round/>
+                      <a:headEnd type="none" w="med" len="med"/>
+                      <a:tailEnd type="none" w="med" len="med"/>
+                    </a:lnT>
+                    <a:lnB w="12700" cap="flat" cmpd="sng" algn="ctr">
+                      <a:solidFill>
+                        <a:schemeClr val="tx1"/>
+                      </a:solidFill>
+                      <a:prstDash val="solid"/>
+                      <a:round/>
+                      <a:headEnd type="none" w="med" len="med"/>
+                      <a:tailEnd type="none" w="med" len="med"/>
+                    </a:lnB>
+                    <a:lnTlToBr w="12700" cmpd="sng">
+                      <a:noFill/>
+                      <a:prstDash val="solid"/>
+                    </a:lnTlToBr>
+                    <a:lnBlToTr w="12700" cmpd="sng">
+                      <a:noFill/>
+                      <a:prstDash val="solid"/>
+                    </a:lnBlToTr>
+                    <a:noFill/>
+                  </a:tcPr>
+                </a:tc>
+                <a:tc>
+                  <a:txBody>
+                    <a:bodyPr/>
+                    <a:lstStyle/>
+                    <a:p>
+                      <a:pPr rtl="0" fontAlgn="b"/>
+                      <a:r>
+                        <a:rPr lang="en-US" sz="1700">
+                          <a:effectLst/>
+                        </a:rPr>
+                        <a:t>Database advanced topics</a:t>
+                      </a:r>
+                    </a:p>
+                  </a:txBody>
+                  <a:tcPr marL="27196" marR="27196" marT="18131" marB="18131" anchor="b">
+                    <a:lnL w="9525" cap="flat" cmpd="sng" algn="ctr">
+                      <a:noFill/>
+                      <a:prstDash val="solid"/>
+                      <a:round/>
+                      <a:headEnd type="none" w="med" len="med"/>
+                      <a:tailEnd type="none" w="med" len="med"/>
+                    </a:lnL>
+                    <a:lnR w="9525" cap="flat" cmpd="sng" algn="ctr">
+                      <a:noFill/>
+                      <a:prstDash val="solid"/>
+                      <a:round/>
+                      <a:headEnd type="none" w="med" len="med"/>
+                      <a:tailEnd type="none" w="med" len="med"/>
+                    </a:lnR>
+                    <a:lnT w="12700" cap="flat" cmpd="sng" algn="ctr">
+                      <a:solidFill>
+                        <a:schemeClr val="tx1"/>
+                      </a:solidFill>
+                      <a:prstDash val="solid"/>
+                      <a:round/>
+                      <a:headEnd type="none" w="med" len="med"/>
+                      <a:tailEnd type="none" w="med" len="med"/>
+                    </a:lnT>
+                    <a:lnB w="12700" cap="flat" cmpd="sng" algn="ctr">
+                      <a:solidFill>
+                        <a:schemeClr val="tx1"/>
+                      </a:solidFill>
+                      <a:prstDash val="solid"/>
+                      <a:round/>
+                      <a:headEnd type="none" w="med" len="med"/>
+                      <a:tailEnd type="none" w="med" len="med"/>
+                    </a:lnB>
+                    <a:lnTlToBr w="12700" cmpd="sng">
+                      <a:noFill/>
+                      <a:prstDash val="solid"/>
+                    </a:lnTlToBr>
+                    <a:lnBlToTr w="12700" cmpd="sng">
+                      <a:noFill/>
+                      <a:prstDash val="solid"/>
+                    </a:lnBlToTr>
+                    <a:noFill/>
+                  </a:tcPr>
+                </a:tc>
+                <a:tc>
+                  <a:txBody>
+                    <a:bodyPr/>
+                    <a:lstStyle/>
+                    <a:p>
+                      <a:pPr algn="r" rtl="0" fontAlgn="b"/>
+                      <a:r>
+                        <a:rPr lang="en-US" sz="1700" dirty="0">
+                          <a:effectLst/>
+                        </a:rPr>
+                        <a:t>120</a:t>
+                      </a:r>
+                    </a:p>
+                  </a:txBody>
+                  <a:tcPr marL="27196" marR="27196" marT="18131" marB="18131" anchor="b">
+                    <a:lnL w="9525" cap="flat" cmpd="sng" algn="ctr">
+                      <a:noFill/>
+                      <a:prstDash val="solid"/>
+                      <a:round/>
+                      <a:headEnd type="none" w="med" len="med"/>
+                      <a:tailEnd type="none" w="med" len="med"/>
+                    </a:lnL>
+                    <a:lnR w="12700" cap="flat" cmpd="sng" algn="ctr">
+                      <a:solidFill>
+                        <a:schemeClr val="tx1"/>
+                      </a:solidFill>
+                      <a:prstDash val="solid"/>
+                      <a:round/>
+                      <a:headEnd type="none" w="med" len="med"/>
+                      <a:tailEnd type="none" w="med" len="med"/>
+                    </a:lnR>
+                    <a:lnT w="12700" cap="flat" cmpd="sng" algn="ctr">
+                      <a:solidFill>
+                        <a:schemeClr val="tx1"/>
+                      </a:solidFill>
+                      <a:prstDash val="solid"/>
+                      <a:round/>
+                      <a:headEnd type="none" w="med" len="med"/>
+                      <a:tailEnd type="none" w="med" len="med"/>
+                    </a:lnT>
+                    <a:lnB w="12700" cap="flat" cmpd="sng" algn="ctr">
+                      <a:solidFill>
+                        <a:schemeClr val="tx1"/>
+                      </a:solidFill>
+                      <a:prstDash val="solid"/>
+                      <a:round/>
+                      <a:headEnd type="none" w="med" len="med"/>
+                      <a:tailEnd type="none" w="med" len="med"/>
+                    </a:lnB>
+                    <a:lnTlToBr w="12700" cmpd="sng">
+                      <a:noFill/>
+                      <a:prstDash val="solid"/>
+                    </a:lnTlToBr>
+                    <a:lnBlToTr w="12700" cmpd="sng">
+                      <a:noFill/>
+                      <a:prstDash val="solid"/>
+                    </a:lnBlToTr>
+                    <a:noFill/>
+                  </a:tcPr>
+                </a:tc>
+                <a:extLst>
+                  <a:ext uri="{0D108BD9-81ED-4DB2-BD59-A6C34878D82A}">
+                    <a16:rowId xmlns:a16="http://schemas.microsoft.com/office/drawing/2014/main" val="1233559936"/>
+                  </a:ext>
+                </a:extLst>
+              </a:tr>
+              <a:tr h="558422">
+                <a:tc>
+                  <a:txBody>
+                    <a:bodyPr/>
+                    <a:lstStyle/>
+                    <a:p>
+                      <a:pPr algn="r" rtl="0" fontAlgn="b"/>
+                      <a:r>
+                        <a:rPr lang="en-US" sz="1700">
+                          <a:effectLst/>
+                        </a:rPr>
+                        <a:t>6</a:t>
+                      </a:r>
+                    </a:p>
+                  </a:txBody>
+                  <a:tcPr marL="27196" marR="27196" marT="18131" marB="18131" anchor="b">
+                    <a:lnL w="12700" cap="flat" cmpd="sng" algn="ctr">
+                      <a:solidFill>
+                        <a:schemeClr val="tx1"/>
+                      </a:solidFill>
+                      <a:prstDash val="solid"/>
+                      <a:round/>
+                      <a:headEnd type="none" w="med" len="med"/>
+                      <a:tailEnd type="none" w="med" len="med"/>
+                    </a:lnL>
+                    <a:lnR w="9525" cap="flat" cmpd="sng" algn="ctr">
+                      <a:noFill/>
+                      <a:prstDash val="solid"/>
+                      <a:round/>
+                      <a:headEnd type="none" w="med" len="med"/>
+                      <a:tailEnd type="none" w="med" len="med"/>
+                    </a:lnR>
+                    <a:lnT w="12700" cap="flat" cmpd="sng" algn="ctr">
+                      <a:solidFill>
+                        <a:schemeClr val="tx1"/>
+                      </a:solidFill>
+                      <a:prstDash val="solid"/>
+                      <a:round/>
+                      <a:headEnd type="none" w="med" len="med"/>
+                      <a:tailEnd type="none" w="med" len="med"/>
+                    </a:lnT>
+                    <a:lnB w="12700" cap="flat" cmpd="sng" algn="ctr">
+                      <a:solidFill>
+                        <a:schemeClr val="tx1"/>
+                      </a:solidFill>
+                      <a:prstDash val="solid"/>
+                      <a:round/>
+                      <a:headEnd type="none" w="med" len="med"/>
+                      <a:tailEnd type="none" w="med" len="med"/>
+                    </a:lnB>
+                    <a:lnTlToBr w="12700" cmpd="sng">
+                      <a:noFill/>
+                      <a:prstDash val="solid"/>
+                    </a:lnTlToBr>
+                    <a:lnBlToTr w="12700" cmpd="sng">
+                      <a:noFill/>
+                      <a:prstDash val="solid"/>
+                    </a:lnBlToTr>
+                    <a:noFill/>
+                  </a:tcPr>
+                </a:tc>
+                <a:tc>
+                  <a:txBody>
+                    <a:bodyPr/>
+                    <a:lstStyle/>
+                    <a:p>
+                      <a:pPr rtl="0" fontAlgn="b"/>
+                      <a:r>
+                        <a:rPr lang="en-US" sz="1700" dirty="0">
+                          <a:effectLst/>
+                        </a:rPr>
+                        <a:t>Using R &amp; Python to query a database</a:t>
+                      </a:r>
+                    </a:p>
+                  </a:txBody>
+                  <a:tcPr marL="27196" marR="27196" marT="18131" marB="18131" anchor="b">
+                    <a:lnL w="9525" cap="flat" cmpd="sng" algn="ctr">
+                      <a:noFill/>
+                      <a:prstDash val="solid"/>
+                      <a:round/>
+                      <a:headEnd type="none" w="med" len="med"/>
+                      <a:tailEnd type="none" w="med" len="med"/>
+                    </a:lnL>
+                    <a:lnR w="9525" cap="flat" cmpd="sng" algn="ctr">
+                      <a:noFill/>
+                      <a:prstDash val="solid"/>
+                      <a:round/>
+                      <a:headEnd type="none" w="med" len="med"/>
+                      <a:tailEnd type="none" w="med" len="med"/>
+                    </a:lnR>
+                    <a:lnT w="12700" cap="flat" cmpd="sng" algn="ctr">
+                      <a:solidFill>
+                        <a:schemeClr val="tx1"/>
+                      </a:solidFill>
+                      <a:prstDash val="solid"/>
+                      <a:round/>
+                      <a:headEnd type="none" w="med" len="med"/>
+                      <a:tailEnd type="none" w="med" len="med"/>
+                    </a:lnT>
+                    <a:lnB w="12700" cap="flat" cmpd="sng" algn="ctr">
+                      <a:solidFill>
+                        <a:schemeClr val="tx1"/>
+                      </a:solidFill>
+                      <a:prstDash val="solid"/>
+                      <a:round/>
+                      <a:headEnd type="none" w="med" len="med"/>
+                      <a:tailEnd type="none" w="med" len="med"/>
+                    </a:lnB>
+                    <a:lnTlToBr w="12700" cmpd="sng">
+                      <a:noFill/>
+                      <a:prstDash val="solid"/>
+                    </a:lnTlToBr>
+                    <a:lnBlToTr w="12700" cmpd="sng">
+                      <a:noFill/>
+                      <a:prstDash val="solid"/>
+                    </a:lnBlToTr>
+                    <a:noFill/>
+                  </a:tcPr>
+                </a:tc>
+                <a:tc>
+                  <a:txBody>
+                    <a:bodyPr/>
+                    <a:lstStyle/>
+                    <a:p>
+                      <a:pPr algn="r" rtl="0" fontAlgn="b"/>
+                      <a:r>
+                        <a:rPr lang="en-US" sz="1700">
+                          <a:effectLst/>
+                        </a:rPr>
+                        <a:t>100</a:t>
+                      </a:r>
+                    </a:p>
+                  </a:txBody>
+                  <a:tcPr marL="27196" marR="27196" marT="18131" marB="18131" anchor="b">
+                    <a:lnL w="9525" cap="flat" cmpd="sng" algn="ctr">
+                      <a:noFill/>
+                      <a:prstDash val="solid"/>
+                      <a:round/>
+                      <a:headEnd type="none" w="med" len="med"/>
+                      <a:tailEnd type="none" w="med" len="med"/>
+                    </a:lnL>
+                    <a:lnR w="12700" cap="flat" cmpd="sng" algn="ctr">
+                      <a:solidFill>
+                        <a:schemeClr val="tx1"/>
+                      </a:solidFill>
+                      <a:prstDash val="solid"/>
+                      <a:round/>
+                      <a:headEnd type="none" w="med" len="med"/>
+                      <a:tailEnd type="none" w="med" len="med"/>
+                    </a:lnR>
+                    <a:lnT w="12700" cap="flat" cmpd="sng" algn="ctr">
+                      <a:solidFill>
+                        <a:schemeClr val="tx1"/>
+                      </a:solidFill>
+                      <a:prstDash val="solid"/>
+                      <a:round/>
+                      <a:headEnd type="none" w="med" len="med"/>
+                      <a:tailEnd type="none" w="med" len="med"/>
+                    </a:lnT>
+                    <a:lnB w="12700" cap="flat" cmpd="sng" algn="ctr">
+                      <a:solidFill>
+                        <a:schemeClr val="tx1"/>
+                      </a:solidFill>
+                      <a:prstDash val="solid"/>
+                      <a:round/>
+                      <a:headEnd type="none" w="med" len="med"/>
+                      <a:tailEnd type="none" w="med" len="med"/>
+                    </a:lnB>
+                    <a:lnTlToBr w="12700" cmpd="sng">
+                      <a:noFill/>
+                      <a:prstDash val="solid"/>
+                    </a:lnTlToBr>
+                    <a:lnBlToTr w="12700" cmpd="sng">
+                      <a:noFill/>
+                      <a:prstDash val="solid"/>
+                    </a:lnBlToTr>
+                    <a:noFill/>
+                  </a:tcPr>
+                </a:tc>
+                <a:extLst>
+                  <a:ext uri="{0D108BD9-81ED-4DB2-BD59-A6C34878D82A}">
+                    <a16:rowId xmlns:a16="http://schemas.microsoft.com/office/drawing/2014/main" val="317442102"/>
+                  </a:ext>
+                </a:extLst>
+              </a:tr>
+              <a:tr h="558422">
+                <a:tc>
+                  <a:txBody>
+                    <a:bodyPr/>
+                    <a:lstStyle/>
+                    <a:p>
+                      <a:pPr algn="r" rtl="0" fontAlgn="b"/>
+                      <a:r>
+                        <a:rPr lang="en-US" sz="1700">
+                          <a:effectLst/>
+                        </a:rPr>
+                        <a:t>7</a:t>
+                      </a:r>
+                    </a:p>
+                  </a:txBody>
+                  <a:tcPr marL="27196" marR="27196" marT="18131" marB="18131" anchor="b">
+                    <a:lnL w="12700" cap="flat" cmpd="sng" algn="ctr">
+                      <a:solidFill>
+                        <a:schemeClr val="tx1"/>
+                      </a:solidFill>
+                      <a:prstDash val="solid"/>
+                      <a:round/>
+                      <a:headEnd type="none" w="med" len="med"/>
+                      <a:tailEnd type="none" w="med" len="med"/>
+                    </a:lnL>
+                    <a:lnR w="9525" cap="flat" cmpd="sng" algn="ctr">
+                      <a:noFill/>
+                      <a:prstDash val="solid"/>
+                      <a:round/>
+                      <a:headEnd type="none" w="med" len="med"/>
+                      <a:tailEnd type="none" w="med" len="med"/>
+                    </a:lnR>
+                    <a:lnT w="12700" cap="flat" cmpd="sng" algn="ctr">
+                      <a:solidFill>
+                        <a:schemeClr val="tx1"/>
+                      </a:solidFill>
+                      <a:prstDash val="solid"/>
+                      <a:round/>
+                      <a:headEnd type="none" w="med" len="med"/>
+                      <a:tailEnd type="none" w="med" len="med"/>
+                    </a:lnT>
+                    <a:lnB w="12700" cap="flat" cmpd="sng" algn="ctr">
+                      <a:solidFill>
+                        <a:schemeClr val="tx1"/>
+                      </a:solidFill>
+                      <a:prstDash val="solid"/>
+                      <a:round/>
+                      <a:headEnd type="none" w="med" len="med"/>
+                      <a:tailEnd type="none" w="med" len="med"/>
+                    </a:lnB>
+                    <a:lnTlToBr w="12700" cmpd="sng">
+                      <a:noFill/>
+                      <a:prstDash val="solid"/>
+                    </a:lnTlToBr>
+                    <a:lnBlToTr w="12700" cmpd="sng">
+                      <a:noFill/>
+                      <a:prstDash val="solid"/>
+                    </a:lnBlToTr>
+                    <a:noFill/>
+                  </a:tcPr>
+                </a:tc>
+                <a:tc>
+                  <a:txBody>
+                    <a:bodyPr/>
+                    <a:lstStyle/>
+                    <a:p>
+                      <a:pPr rtl="0" fontAlgn="b"/>
+                      <a:r>
+                        <a:rPr lang="en-US" sz="1700" dirty="0">
+                          <a:effectLst/>
+                        </a:rPr>
+                        <a:t>Documentation Capstone project   - </a:t>
+                      </a:r>
+                      <a:r>
+                        <a:rPr lang="en-US" sz="1700" i="1" dirty="0">
+                          <a:effectLst/>
+                        </a:rPr>
+                        <a:t>metadata</a:t>
+                      </a:r>
+                    </a:p>
+                  </a:txBody>
+                  <a:tcPr marL="27196" marR="27196" marT="18131" marB="18131" anchor="b">
+                    <a:lnL w="9525" cap="flat" cmpd="sng" algn="ctr">
+                      <a:noFill/>
+                      <a:prstDash val="solid"/>
+                      <a:round/>
+                      <a:headEnd type="none" w="med" len="med"/>
+                      <a:tailEnd type="none" w="med" len="med"/>
+                    </a:lnL>
+                    <a:lnR w="9525" cap="flat" cmpd="sng" algn="ctr">
+                      <a:noFill/>
+                      <a:prstDash val="solid"/>
+                      <a:round/>
+                      <a:headEnd type="none" w="med" len="med"/>
+                      <a:tailEnd type="none" w="med" len="med"/>
+                    </a:lnR>
+                    <a:lnT w="12700" cap="flat" cmpd="sng" algn="ctr">
+                      <a:solidFill>
+                        <a:schemeClr val="tx1"/>
+                      </a:solidFill>
+                      <a:prstDash val="solid"/>
+                      <a:round/>
+                      <a:headEnd type="none" w="med" len="med"/>
+                      <a:tailEnd type="none" w="med" len="med"/>
+                    </a:lnT>
+                    <a:lnB w="12700" cap="flat" cmpd="sng" algn="ctr">
+                      <a:solidFill>
+                        <a:schemeClr val="tx1"/>
+                      </a:solidFill>
+                      <a:prstDash val="solid"/>
+                      <a:round/>
+                      <a:headEnd type="none" w="med" len="med"/>
+                      <a:tailEnd type="none" w="med" len="med"/>
+                    </a:lnB>
+                    <a:lnTlToBr w="12700" cmpd="sng">
+                      <a:noFill/>
+                      <a:prstDash val="solid"/>
+                    </a:lnTlToBr>
+                    <a:lnBlToTr w="12700" cmpd="sng">
+                      <a:noFill/>
+                      <a:prstDash val="solid"/>
+                    </a:lnBlToTr>
+                    <a:noFill/>
+                  </a:tcPr>
+                </a:tc>
+                <a:tc>
+                  <a:txBody>
+                    <a:bodyPr/>
+                    <a:lstStyle/>
+                    <a:p>
+                      <a:pPr algn="r" rtl="0" fontAlgn="b"/>
+                      <a:r>
+                        <a:rPr lang="en-US" sz="1700" dirty="0">
+                          <a:effectLst/>
+                        </a:rPr>
+                        <a:t>50</a:t>
+                      </a:r>
+                    </a:p>
+                  </a:txBody>
+                  <a:tcPr marL="27196" marR="27196" marT="18131" marB="18131" anchor="b">
+                    <a:lnL w="9525" cap="flat" cmpd="sng" algn="ctr">
+                      <a:noFill/>
+                      <a:prstDash val="solid"/>
+                      <a:round/>
+                      <a:headEnd type="none" w="med" len="med"/>
+                      <a:tailEnd type="none" w="med" len="med"/>
+                    </a:lnL>
+                    <a:lnR w="12700" cap="flat" cmpd="sng" algn="ctr">
+                      <a:solidFill>
+                        <a:schemeClr val="tx1"/>
+                      </a:solidFill>
+                      <a:prstDash val="solid"/>
+                      <a:round/>
+                      <a:headEnd type="none" w="med" len="med"/>
+                      <a:tailEnd type="none" w="med" len="med"/>
+                    </a:lnR>
+                    <a:lnT w="12700" cap="flat" cmpd="sng" algn="ctr">
+                      <a:solidFill>
+                        <a:schemeClr val="tx1"/>
+                      </a:solidFill>
+                      <a:prstDash val="solid"/>
+                      <a:round/>
+                      <a:headEnd type="none" w="med" len="med"/>
+                      <a:tailEnd type="none" w="med" len="med"/>
+                    </a:lnT>
+                    <a:lnB w="12700" cap="flat" cmpd="sng" algn="ctr">
+                      <a:solidFill>
+                        <a:schemeClr val="tx1"/>
+                      </a:solidFill>
+                      <a:prstDash val="solid"/>
+                      <a:round/>
+                      <a:headEnd type="none" w="med" len="med"/>
+                      <a:tailEnd type="none" w="med" len="med"/>
+                    </a:lnB>
+                    <a:lnTlToBr w="12700" cmpd="sng">
+                      <a:noFill/>
+                      <a:prstDash val="solid"/>
+                    </a:lnTlToBr>
+                    <a:lnBlToTr w="12700" cmpd="sng">
+                      <a:noFill/>
+                      <a:prstDash val="solid"/>
+                    </a:lnBlToTr>
+                    <a:noFill/>
+                  </a:tcPr>
+                </a:tc>
+                <a:extLst>
+                  <a:ext uri="{0D108BD9-81ED-4DB2-BD59-A6C34878D82A}">
+                    <a16:rowId xmlns:a16="http://schemas.microsoft.com/office/drawing/2014/main" val="2729882755"/>
+                  </a:ext>
+                </a:extLst>
+              </a:tr>
+              <a:tr h="558422">
+                <a:tc>
+                  <a:txBody>
+                    <a:bodyPr/>
+                    <a:lstStyle/>
+                    <a:p>
+                      <a:pPr algn="r" rtl="0" fontAlgn="b"/>
+                      <a:r>
+                        <a:rPr lang="en-US" sz="1700">
+                          <a:effectLst/>
+                        </a:rPr>
+                        <a:t>8</a:t>
+                      </a:r>
+                    </a:p>
+                  </a:txBody>
+                  <a:tcPr marL="27196" marR="27196" marT="18131" marB="18131" anchor="b">
+                    <a:lnL w="12700" cap="flat" cmpd="sng" algn="ctr">
+                      <a:solidFill>
+                        <a:schemeClr val="tx1"/>
+                      </a:solidFill>
+                      <a:prstDash val="solid"/>
+                      <a:round/>
+                      <a:headEnd type="none" w="med" len="med"/>
+                      <a:tailEnd type="none" w="med" len="med"/>
+                    </a:lnL>
+                    <a:lnR w="9525" cap="flat" cmpd="sng" algn="ctr">
+                      <a:noFill/>
+                      <a:prstDash val="solid"/>
+                      <a:round/>
+                      <a:headEnd type="none" w="med" len="med"/>
+                      <a:tailEnd type="none" w="med" len="med"/>
+                    </a:lnR>
+                    <a:lnT w="12700" cap="flat" cmpd="sng" algn="ctr">
+                      <a:solidFill>
+                        <a:schemeClr val="tx1"/>
+                      </a:solidFill>
+                      <a:prstDash val="solid"/>
+                      <a:round/>
+                      <a:headEnd type="none" w="med" len="med"/>
+                      <a:tailEnd type="none" w="med" len="med"/>
+                    </a:lnT>
+                    <a:lnB w="12700" cap="flat" cmpd="sng" algn="ctr">
+                      <a:solidFill>
+                        <a:schemeClr val="tx1"/>
+                      </a:solidFill>
+                      <a:prstDash val="solid"/>
+                      <a:round/>
+                      <a:headEnd type="none" w="med" len="med"/>
+                      <a:tailEnd type="none" w="med" len="med"/>
+                    </a:lnB>
+                    <a:lnTlToBr w="12700" cmpd="sng">
+                      <a:noFill/>
+                      <a:prstDash val="solid"/>
+                    </a:lnTlToBr>
+                    <a:lnBlToTr w="12700" cmpd="sng">
+                      <a:noFill/>
+                      <a:prstDash val="solid"/>
+                    </a:lnBlToTr>
+                    <a:noFill/>
+                  </a:tcPr>
+                </a:tc>
+                <a:tc>
+                  <a:txBody>
+                    <a:bodyPr/>
+                    <a:lstStyle/>
+                    <a:p>
+                      <a:pPr rtl="0" fontAlgn="b"/>
+                      <a:r>
+                        <a:rPr lang="en-US" sz="1700" dirty="0">
+                          <a:effectLst/>
+                        </a:rPr>
+                        <a:t>Documentation Capstone project - </a:t>
+                      </a:r>
+                      <a:r>
+                        <a:rPr lang="en-US" sz="1700" i="1" dirty="0">
+                          <a:effectLst/>
+                        </a:rPr>
+                        <a:t>computing env</a:t>
+                      </a:r>
+                    </a:p>
+                  </a:txBody>
+                  <a:tcPr marL="27196" marR="27196" marT="18131" marB="18131" anchor="b">
+                    <a:lnL w="9525" cap="flat" cmpd="sng" algn="ctr">
+                      <a:noFill/>
+                      <a:prstDash val="solid"/>
+                      <a:round/>
+                      <a:headEnd type="none" w="med" len="med"/>
+                      <a:tailEnd type="none" w="med" len="med"/>
+                    </a:lnL>
+                    <a:lnR w="9525" cap="flat" cmpd="sng" algn="ctr">
+                      <a:noFill/>
+                      <a:prstDash val="solid"/>
+                      <a:round/>
+                      <a:headEnd type="none" w="med" len="med"/>
+                      <a:tailEnd type="none" w="med" len="med"/>
+                    </a:lnR>
+                    <a:lnT w="12700" cap="flat" cmpd="sng" algn="ctr">
+                      <a:solidFill>
+                        <a:schemeClr val="tx1"/>
+                      </a:solidFill>
+                      <a:prstDash val="solid"/>
+                      <a:round/>
+                      <a:headEnd type="none" w="med" len="med"/>
+                      <a:tailEnd type="none" w="med" len="med"/>
+                    </a:lnT>
+                    <a:lnB w="12700" cap="flat" cmpd="sng" algn="ctr">
+                      <a:solidFill>
+                        <a:schemeClr val="tx1"/>
+                      </a:solidFill>
+                      <a:prstDash val="solid"/>
+                      <a:round/>
+                      <a:headEnd type="none" w="med" len="med"/>
+                      <a:tailEnd type="none" w="med" len="med"/>
+                    </a:lnB>
+                    <a:lnTlToBr w="12700" cmpd="sng">
+                      <a:noFill/>
+                      <a:prstDash val="solid"/>
+                    </a:lnTlToBr>
+                    <a:lnBlToTr w="12700" cmpd="sng">
+                      <a:noFill/>
+                      <a:prstDash val="solid"/>
+                    </a:lnBlToTr>
+                    <a:noFill/>
+                  </a:tcPr>
+                </a:tc>
+                <a:tc>
+                  <a:txBody>
+                    <a:bodyPr/>
+                    <a:lstStyle/>
+                    <a:p>
+                      <a:pPr algn="r" rtl="0" fontAlgn="b"/>
+                      <a:r>
+                        <a:rPr lang="en-US" sz="1700">
+                          <a:effectLst/>
+                        </a:rPr>
+                        <a:t>50</a:t>
+                      </a:r>
+                    </a:p>
+                  </a:txBody>
+                  <a:tcPr marL="27196" marR="27196" marT="18131" marB="18131" anchor="b">
+                    <a:lnL w="9525" cap="flat" cmpd="sng" algn="ctr">
+                      <a:noFill/>
+                      <a:prstDash val="solid"/>
+                      <a:round/>
+                      <a:headEnd type="none" w="med" len="med"/>
+                      <a:tailEnd type="none" w="med" len="med"/>
+                    </a:lnL>
+                    <a:lnR w="12700" cap="flat" cmpd="sng" algn="ctr">
+                      <a:solidFill>
+                        <a:schemeClr val="tx1"/>
+                      </a:solidFill>
+                      <a:prstDash val="solid"/>
+                      <a:round/>
+                      <a:headEnd type="none" w="med" len="med"/>
+                      <a:tailEnd type="none" w="med" len="med"/>
+                    </a:lnR>
+                    <a:lnT w="12700" cap="flat" cmpd="sng" algn="ctr">
+                      <a:solidFill>
+                        <a:schemeClr val="tx1"/>
+                      </a:solidFill>
+                      <a:prstDash val="solid"/>
+                      <a:round/>
+                      <a:headEnd type="none" w="med" len="med"/>
+                      <a:tailEnd type="none" w="med" len="med"/>
+                    </a:lnT>
+                    <a:lnB w="12700" cap="flat" cmpd="sng" algn="ctr">
+                      <a:solidFill>
+                        <a:schemeClr val="tx1"/>
+                      </a:solidFill>
+                      <a:prstDash val="solid"/>
+                      <a:round/>
+                      <a:headEnd type="none" w="med" len="med"/>
+                      <a:tailEnd type="none" w="med" len="med"/>
+                    </a:lnB>
+                    <a:lnTlToBr w="12700" cmpd="sng">
+                      <a:noFill/>
+                      <a:prstDash val="solid"/>
+                    </a:lnTlToBr>
+                    <a:lnBlToTr w="12700" cmpd="sng">
+                      <a:noFill/>
+                      <a:prstDash val="solid"/>
+                    </a:lnBlToTr>
+                    <a:noFill/>
+                  </a:tcPr>
+                </a:tc>
+                <a:extLst>
+                  <a:ext uri="{0D108BD9-81ED-4DB2-BD59-A6C34878D82A}">
+                    <a16:rowId xmlns:a16="http://schemas.microsoft.com/office/drawing/2014/main" val="1574768575"/>
+                  </a:ext>
+                </a:extLst>
+              </a:tr>
+              <a:tr h="297341">
+                <a:tc>
+                  <a:txBody>
+                    <a:bodyPr/>
+                    <a:lstStyle/>
+                    <a:p>
+                      <a:pPr algn="r" rtl="0" fontAlgn="b"/>
+                      <a:r>
+                        <a:rPr lang="en-US" sz="1700">
+                          <a:effectLst/>
+                        </a:rPr>
+                        <a:t>9</a:t>
+                      </a:r>
+                    </a:p>
+                  </a:txBody>
+                  <a:tcPr marL="27196" marR="27196" marT="18131" marB="18131" anchor="b">
+                    <a:lnL w="12700" cap="flat" cmpd="sng" algn="ctr">
+                      <a:solidFill>
+                        <a:schemeClr val="tx1"/>
+                      </a:solidFill>
+                      <a:prstDash val="solid"/>
+                      <a:round/>
+                      <a:headEnd type="none" w="med" len="med"/>
+                      <a:tailEnd type="none" w="med" len="med"/>
+                    </a:lnL>
+                    <a:lnR w="9525" cap="flat" cmpd="sng" algn="ctr">
+                      <a:noFill/>
+                      <a:prstDash val="solid"/>
+                      <a:round/>
+                      <a:headEnd type="none" w="med" len="med"/>
+                      <a:tailEnd type="none" w="med" len="med"/>
+                    </a:lnR>
+                    <a:lnT w="12700" cap="flat" cmpd="sng" algn="ctr">
+                      <a:solidFill>
+                        <a:schemeClr val="tx1"/>
+                      </a:solidFill>
+                      <a:prstDash val="solid"/>
+                      <a:round/>
+                      <a:headEnd type="none" w="med" len="med"/>
+                      <a:tailEnd type="none" w="med" len="med"/>
+                    </a:lnT>
+                    <a:lnB w="12700" cap="flat" cmpd="sng" algn="ctr">
+                      <a:solidFill>
+                        <a:schemeClr val="tx1"/>
+                      </a:solidFill>
+                      <a:prstDash val="solid"/>
+                      <a:round/>
+                      <a:headEnd type="none" w="med" len="med"/>
+                      <a:tailEnd type="none" w="med" len="med"/>
+                    </a:lnB>
+                    <a:lnTlToBr w="12700" cmpd="sng">
+                      <a:noFill/>
+                      <a:prstDash val="solid"/>
+                    </a:lnTlToBr>
+                    <a:lnBlToTr w="12700" cmpd="sng">
+                      <a:noFill/>
+                      <a:prstDash val="solid"/>
+                    </a:lnBlToTr>
+                    <a:noFill/>
+                  </a:tcPr>
+                </a:tc>
+                <a:tc>
+                  <a:txBody>
+                    <a:bodyPr/>
+                    <a:lstStyle/>
+                    <a:p>
+                      <a:pPr rtl="0" fontAlgn="b"/>
+                      <a:r>
+                        <a:rPr lang="en-US" sz="1700">
+                          <a:effectLst/>
+                        </a:rPr>
+                        <a:t>- </a:t>
+                      </a:r>
+                    </a:p>
+                  </a:txBody>
+                  <a:tcPr marL="27196" marR="27196" marT="18131" marB="18131" anchor="b">
+                    <a:lnL w="9525" cap="flat" cmpd="sng" algn="ctr">
+                      <a:noFill/>
+                      <a:prstDash val="solid"/>
+                      <a:round/>
+                      <a:headEnd type="none" w="med" len="med"/>
+                      <a:tailEnd type="none" w="med" len="med"/>
+                    </a:lnL>
+                    <a:lnR w="9525" cap="flat" cmpd="sng" algn="ctr">
+                      <a:noFill/>
+                      <a:prstDash val="solid"/>
+                      <a:round/>
+                      <a:headEnd type="none" w="med" len="med"/>
+                      <a:tailEnd type="none" w="med" len="med"/>
+                    </a:lnR>
+                    <a:lnT w="12700" cap="flat" cmpd="sng" algn="ctr">
+                      <a:solidFill>
+                        <a:schemeClr val="tx1"/>
+                      </a:solidFill>
+                      <a:prstDash val="solid"/>
+                      <a:round/>
+                      <a:headEnd type="none" w="med" len="med"/>
+                      <a:tailEnd type="none" w="med" len="med"/>
+                    </a:lnT>
+                    <a:lnB w="12700" cap="flat" cmpd="sng" algn="ctr">
+                      <a:solidFill>
+                        <a:schemeClr val="tx1"/>
+                      </a:solidFill>
+                      <a:prstDash val="solid"/>
+                      <a:round/>
+                      <a:headEnd type="none" w="med" len="med"/>
+                      <a:tailEnd type="none" w="med" len="med"/>
+                    </a:lnB>
+                    <a:lnTlToBr w="12700" cmpd="sng">
+                      <a:noFill/>
+                      <a:prstDash val="solid"/>
+                    </a:lnTlToBr>
+                    <a:lnBlToTr w="12700" cmpd="sng">
+                      <a:noFill/>
+                      <a:prstDash val="solid"/>
+                    </a:lnBlToTr>
+                    <a:noFill/>
+                  </a:tcPr>
+                </a:tc>
+                <a:tc>
+                  <a:txBody>
+                    <a:bodyPr/>
+                    <a:lstStyle/>
+                    <a:p>
+                      <a:pPr algn="r" rtl="0" fontAlgn="b"/>
+                      <a:r>
+                        <a:rPr lang="en-US" sz="1700">
+                          <a:effectLst/>
+                        </a:rPr>
+                        <a:t>0</a:t>
+                      </a:r>
+                    </a:p>
+                  </a:txBody>
+                  <a:tcPr marL="27196" marR="27196" marT="18131" marB="18131" anchor="b">
+                    <a:lnL w="9525" cap="flat" cmpd="sng" algn="ctr">
+                      <a:noFill/>
+                      <a:prstDash val="solid"/>
+                      <a:round/>
+                      <a:headEnd type="none" w="med" len="med"/>
+                      <a:tailEnd type="none" w="med" len="med"/>
+                    </a:lnL>
+                    <a:lnR w="12700" cap="flat" cmpd="sng" algn="ctr">
+                      <a:solidFill>
+                        <a:schemeClr val="tx1"/>
+                      </a:solidFill>
+                      <a:prstDash val="solid"/>
+                      <a:round/>
+                      <a:headEnd type="none" w="med" len="med"/>
+                      <a:tailEnd type="none" w="med" len="med"/>
+                    </a:lnR>
+                    <a:lnT w="12700" cap="flat" cmpd="sng" algn="ctr">
+                      <a:solidFill>
+                        <a:schemeClr val="tx1"/>
+                      </a:solidFill>
+                      <a:prstDash val="solid"/>
+                      <a:round/>
+                      <a:headEnd type="none" w="med" len="med"/>
+                      <a:tailEnd type="none" w="med" len="med"/>
+                    </a:lnT>
+                    <a:lnB w="12700" cap="flat" cmpd="sng" algn="ctr">
+                      <a:solidFill>
+                        <a:schemeClr val="tx1"/>
+                      </a:solidFill>
+                      <a:prstDash val="solid"/>
+                      <a:round/>
+                      <a:headEnd type="none" w="med" len="med"/>
+                      <a:tailEnd type="none" w="med" len="med"/>
+                    </a:lnB>
+                    <a:lnTlToBr w="12700" cmpd="sng">
+                      <a:noFill/>
+                      <a:prstDash val="solid"/>
+                    </a:lnTlToBr>
+                    <a:lnBlToTr w="12700" cmpd="sng">
+                      <a:noFill/>
+                      <a:prstDash val="solid"/>
+                    </a:lnBlToTr>
+                    <a:noFill/>
+                  </a:tcPr>
+                </a:tc>
+                <a:extLst>
+                  <a:ext uri="{0D108BD9-81ED-4DB2-BD59-A6C34878D82A}">
+                    <a16:rowId xmlns:a16="http://schemas.microsoft.com/office/drawing/2014/main" val="815773450"/>
+                  </a:ext>
+                </a:extLst>
+              </a:tr>
+              <a:tr h="297341">
+                <a:tc>
+                  <a:txBody>
+                    <a:bodyPr/>
+                    <a:lstStyle/>
+                    <a:p>
+                      <a:pPr algn="r" rtl="0" fontAlgn="b"/>
+                      <a:r>
+                        <a:rPr lang="en-US" sz="1700">
+                          <a:effectLst/>
+                        </a:rPr>
+                        <a:t>10</a:t>
+                      </a:r>
+                    </a:p>
+                  </a:txBody>
+                  <a:tcPr marL="27196" marR="27196" marT="18131" marB="18131" anchor="b">
+                    <a:lnL w="12700" cap="flat" cmpd="sng" algn="ctr">
+                      <a:solidFill>
+                        <a:schemeClr val="tx1"/>
+                      </a:solidFill>
+                      <a:prstDash val="solid"/>
+                      <a:round/>
+                      <a:headEnd type="none" w="med" len="med"/>
+                      <a:tailEnd type="none" w="med" len="med"/>
+                    </a:lnL>
+                    <a:lnR w="9525" cap="flat" cmpd="sng" algn="ctr">
+                      <a:noFill/>
+                      <a:prstDash val="solid"/>
+                      <a:round/>
+                      <a:headEnd type="none" w="med" len="med"/>
+                      <a:tailEnd type="none" w="med" len="med"/>
+                    </a:lnR>
+                    <a:lnT w="12700" cap="flat" cmpd="sng" algn="ctr">
+                      <a:solidFill>
+                        <a:schemeClr val="tx1"/>
+                      </a:solidFill>
+                      <a:prstDash val="solid"/>
+                      <a:round/>
+                      <a:headEnd type="none" w="med" len="med"/>
+                      <a:tailEnd type="none" w="med" len="med"/>
+                    </a:lnT>
+                    <a:lnB w="12700" cap="flat" cmpd="sng" algn="ctr">
+                      <a:solidFill>
+                        <a:schemeClr val="tx1"/>
+                      </a:solidFill>
+                      <a:prstDash val="solid"/>
+                      <a:round/>
+                      <a:headEnd type="none" w="med" len="med"/>
+                      <a:tailEnd type="none" w="med" len="med"/>
+                    </a:lnB>
+                    <a:lnTlToBr w="12700" cmpd="sng">
+                      <a:noFill/>
+                      <a:prstDash val="solid"/>
+                    </a:lnTlToBr>
+                    <a:lnBlToTr w="12700" cmpd="sng">
+                      <a:noFill/>
+                      <a:prstDash val="solid"/>
+                    </a:lnBlToTr>
+                    <a:noFill/>
+                  </a:tcPr>
+                </a:tc>
+                <a:tc>
+                  <a:txBody>
+                    <a:bodyPr/>
+                    <a:lstStyle/>
+                    <a:p>
+                      <a:pPr rtl="0" fontAlgn="b"/>
+                      <a:r>
+                        <a:rPr lang="en-US" sz="1700">
+                          <a:effectLst/>
+                        </a:rPr>
+                        <a:t>- </a:t>
+                      </a:r>
+                    </a:p>
+                  </a:txBody>
+                  <a:tcPr marL="27196" marR="27196" marT="18131" marB="18131" anchor="b">
+                    <a:lnL w="9525" cap="flat" cmpd="sng" algn="ctr">
+                      <a:noFill/>
+                      <a:prstDash val="solid"/>
+                      <a:round/>
+                      <a:headEnd type="none" w="med" len="med"/>
+                      <a:tailEnd type="none" w="med" len="med"/>
+                    </a:lnL>
+                    <a:lnR w="9525" cap="flat" cmpd="sng" algn="ctr">
+                      <a:noFill/>
+                      <a:prstDash val="solid"/>
+                      <a:round/>
+                      <a:headEnd type="none" w="med" len="med"/>
+                      <a:tailEnd type="none" w="med" len="med"/>
+                    </a:lnR>
+                    <a:lnT w="12700" cap="flat" cmpd="sng" algn="ctr">
+                      <a:solidFill>
+                        <a:schemeClr val="tx1"/>
+                      </a:solidFill>
+                      <a:prstDash val="solid"/>
+                      <a:round/>
+                      <a:headEnd type="none" w="med" len="med"/>
+                      <a:tailEnd type="none" w="med" len="med"/>
+                    </a:lnT>
+                    <a:lnB w="12700" cap="flat" cmpd="sng" algn="ctr">
+                      <a:solidFill>
+                        <a:schemeClr val="tx1"/>
+                      </a:solidFill>
+                      <a:prstDash val="solid"/>
+                      <a:round/>
+                      <a:headEnd type="none" w="med" len="med"/>
+                      <a:tailEnd type="none" w="med" len="med"/>
+                    </a:lnB>
+                    <a:lnTlToBr w="12700" cmpd="sng">
+                      <a:noFill/>
+                      <a:prstDash val="solid"/>
+                    </a:lnTlToBr>
+                    <a:lnBlToTr w="12700" cmpd="sng">
+                      <a:noFill/>
+                      <a:prstDash val="solid"/>
+                    </a:lnBlToTr>
+                    <a:noFill/>
+                  </a:tcPr>
+                </a:tc>
+                <a:tc>
+                  <a:txBody>
+                    <a:bodyPr/>
+                    <a:lstStyle/>
+                    <a:p>
+                      <a:pPr algn="r" rtl="0" fontAlgn="b"/>
+                      <a:r>
+                        <a:rPr lang="en-US" sz="1700">
+                          <a:effectLst/>
+                        </a:rPr>
+                        <a:t>0</a:t>
+                      </a:r>
+                    </a:p>
+                  </a:txBody>
+                  <a:tcPr marL="27196" marR="27196" marT="18131" marB="18131" anchor="b">
+                    <a:lnL w="9525" cap="flat" cmpd="sng" algn="ctr">
+                      <a:noFill/>
+                      <a:prstDash val="solid"/>
+                      <a:round/>
+                      <a:headEnd type="none" w="med" len="med"/>
+                      <a:tailEnd type="none" w="med" len="med"/>
+                    </a:lnL>
+                    <a:lnR w="12700" cap="flat" cmpd="sng" algn="ctr">
+                      <a:solidFill>
+                        <a:schemeClr val="tx1"/>
+                      </a:solidFill>
+                      <a:prstDash val="solid"/>
+                      <a:round/>
+                      <a:headEnd type="none" w="med" len="med"/>
+                      <a:tailEnd type="none" w="med" len="med"/>
+                    </a:lnR>
+                    <a:lnT w="12700" cap="flat" cmpd="sng" algn="ctr">
+                      <a:solidFill>
+                        <a:schemeClr val="tx1"/>
+                      </a:solidFill>
+                      <a:prstDash val="solid"/>
+                      <a:round/>
+                      <a:headEnd type="none" w="med" len="med"/>
+                      <a:tailEnd type="none" w="med" len="med"/>
+                    </a:lnT>
+                    <a:lnB w="12700" cap="flat" cmpd="sng" algn="ctr">
+                      <a:solidFill>
+                        <a:schemeClr val="tx1"/>
+                      </a:solidFill>
+                      <a:prstDash val="solid"/>
+                      <a:round/>
+                      <a:headEnd type="none" w="med" len="med"/>
+                      <a:tailEnd type="none" w="med" len="med"/>
+                    </a:lnB>
+                    <a:lnTlToBr w="12700" cmpd="sng">
+                      <a:noFill/>
+                      <a:prstDash val="solid"/>
+                    </a:lnTlToBr>
+                    <a:lnBlToTr w="12700" cmpd="sng">
+                      <a:noFill/>
+                      <a:prstDash val="solid"/>
+                    </a:lnBlToTr>
+                    <a:noFill/>
+                  </a:tcPr>
+                </a:tc>
+                <a:extLst>
+                  <a:ext uri="{0D108BD9-81ED-4DB2-BD59-A6C34878D82A}">
+                    <a16:rowId xmlns:a16="http://schemas.microsoft.com/office/drawing/2014/main" val="2707081764"/>
+                  </a:ext>
+                </a:extLst>
+              </a:tr>
+              <a:tr h="297341">
+                <a:tc>
+                  <a:txBody>
+                    <a:bodyPr/>
+                    <a:lstStyle/>
+                    <a:p>
+                      <a:pPr rtl="0" fontAlgn="b"/>
+                      <a:r>
+                        <a:rPr lang="en-US" sz="1700" dirty="0">
+                          <a:effectLst/>
+                        </a:rPr>
+                        <a:t>Discussion</a:t>
+                      </a:r>
+                    </a:p>
+                  </a:txBody>
+                  <a:tcPr marL="27196" marR="27196" marT="18131" marB="18131" anchor="b">
+                    <a:lnL w="12700" cap="flat" cmpd="sng" algn="ctr">
+                      <a:solidFill>
+                        <a:schemeClr val="tx1"/>
+                      </a:solidFill>
+                      <a:prstDash val="solid"/>
+                      <a:round/>
+                      <a:headEnd type="none" w="med" len="med"/>
+                      <a:tailEnd type="none" w="med" len="med"/>
+                    </a:lnL>
+                    <a:lnR w="9525" cap="flat" cmpd="sng" algn="ctr">
+                      <a:noFill/>
+                      <a:prstDash val="solid"/>
+                      <a:round/>
+                      <a:headEnd type="none" w="med" len="med"/>
+                      <a:tailEnd type="none" w="med" len="med"/>
+                    </a:lnR>
+                    <a:lnT w="12700" cap="flat" cmpd="sng" algn="ctr">
+                      <a:solidFill>
+                        <a:schemeClr val="tx1"/>
+                      </a:solidFill>
+                      <a:prstDash val="solid"/>
+                      <a:round/>
+                      <a:headEnd type="none" w="med" len="med"/>
+                      <a:tailEnd type="none" w="med" len="med"/>
+                    </a:lnT>
+                    <a:lnB w="12700" cap="flat" cmpd="sng" algn="ctr">
+                      <a:solidFill>
+                        <a:schemeClr val="tx1"/>
+                      </a:solidFill>
+                      <a:prstDash val="solid"/>
+                      <a:round/>
+                      <a:headEnd type="none" w="med" len="med"/>
+                      <a:tailEnd type="none" w="med" len="med"/>
+                    </a:lnB>
+                    <a:lnTlToBr w="12700" cmpd="sng">
+                      <a:noFill/>
+                      <a:prstDash val="solid"/>
+                    </a:lnTlToBr>
+                    <a:lnBlToTr w="12700" cmpd="sng">
+                      <a:noFill/>
+                      <a:prstDash val="solid"/>
+                    </a:lnBlToTr>
+                    <a:noFill/>
+                  </a:tcPr>
+                </a:tc>
+                <a:tc>
+                  <a:txBody>
+                    <a:bodyPr/>
+                    <a:lstStyle/>
+                    <a:p>
+                      <a:pPr rtl="0" fontAlgn="b"/>
+                      <a:r>
+                        <a:rPr lang="en-US" sz="1700" dirty="0">
+                          <a:effectLst/>
+                        </a:rPr>
+                        <a:t>Discussion project</a:t>
+                      </a:r>
+                    </a:p>
+                  </a:txBody>
+                  <a:tcPr marL="27196" marR="27196" marT="18131" marB="18131" anchor="b">
+                    <a:lnL w="9525" cap="flat" cmpd="sng" algn="ctr">
+                      <a:noFill/>
+                      <a:prstDash val="solid"/>
+                      <a:round/>
+                      <a:headEnd type="none" w="med" len="med"/>
+                      <a:tailEnd type="none" w="med" len="med"/>
+                    </a:lnL>
+                    <a:lnR w="9525" cap="flat" cmpd="sng" algn="ctr">
+                      <a:noFill/>
+                      <a:prstDash val="solid"/>
+                      <a:round/>
+                      <a:headEnd type="none" w="med" len="med"/>
+                      <a:tailEnd type="none" w="med" len="med"/>
+                    </a:lnR>
+                    <a:lnT w="12700" cap="flat" cmpd="sng" algn="ctr">
+                      <a:solidFill>
+                        <a:schemeClr val="tx1"/>
+                      </a:solidFill>
+                      <a:prstDash val="solid"/>
+                      <a:round/>
+                      <a:headEnd type="none" w="med" len="med"/>
+                      <a:tailEnd type="none" w="med" len="med"/>
+                    </a:lnT>
+                    <a:lnB w="12700" cap="flat" cmpd="sng" algn="ctr">
+                      <a:solidFill>
+                        <a:schemeClr val="tx1"/>
+                      </a:solidFill>
+                      <a:prstDash val="solid"/>
+                      <a:round/>
+                      <a:headEnd type="none" w="med" len="med"/>
+                      <a:tailEnd type="none" w="med" len="med"/>
+                    </a:lnB>
+                    <a:lnTlToBr w="12700" cmpd="sng">
+                      <a:noFill/>
+                      <a:prstDash val="solid"/>
+                    </a:lnTlToBr>
+                    <a:lnBlToTr w="12700" cmpd="sng">
+                      <a:noFill/>
+                      <a:prstDash val="solid"/>
+                    </a:lnBlToTr>
+                    <a:noFill/>
+                  </a:tcPr>
+                </a:tc>
+                <a:tc>
+                  <a:txBody>
+                    <a:bodyPr/>
+                    <a:lstStyle/>
+                    <a:p>
+                      <a:pPr algn="r" rtl="0" fontAlgn="b"/>
+                      <a:r>
+                        <a:rPr lang="en-US" sz="1700" dirty="0">
+                          <a:effectLst/>
+                        </a:rPr>
+                        <a:t>150</a:t>
+                      </a:r>
+                    </a:p>
+                  </a:txBody>
+                  <a:tcPr marL="27196" marR="27196" marT="18131" marB="18131" anchor="b">
+                    <a:lnL w="9525" cap="flat" cmpd="sng" algn="ctr">
+                      <a:noFill/>
+                      <a:prstDash val="solid"/>
+                      <a:round/>
+                      <a:headEnd type="none" w="med" len="med"/>
+                      <a:tailEnd type="none" w="med" len="med"/>
+                    </a:lnL>
+                    <a:lnR w="12700" cap="flat" cmpd="sng" algn="ctr">
+                      <a:solidFill>
+                        <a:schemeClr val="tx1"/>
+                      </a:solidFill>
+                      <a:prstDash val="solid"/>
+                      <a:round/>
+                      <a:headEnd type="none" w="med" len="med"/>
+                      <a:tailEnd type="none" w="med" len="med"/>
+                    </a:lnR>
+                    <a:lnT w="12700" cap="flat" cmpd="sng" algn="ctr">
+                      <a:solidFill>
+                        <a:schemeClr val="tx1"/>
+                      </a:solidFill>
+                      <a:prstDash val="solid"/>
+                      <a:round/>
+                      <a:headEnd type="none" w="med" len="med"/>
+                      <a:tailEnd type="none" w="med" len="med"/>
+                    </a:lnT>
+                    <a:lnB w="12700" cap="flat" cmpd="sng" algn="ctr">
+                      <a:solidFill>
+                        <a:schemeClr val="tx1"/>
+                      </a:solidFill>
+                      <a:prstDash val="solid"/>
+                      <a:round/>
+                      <a:headEnd type="none" w="med" len="med"/>
+                      <a:tailEnd type="none" w="med" len="med"/>
+                    </a:lnB>
+                    <a:lnTlToBr w="12700" cmpd="sng">
+                      <a:noFill/>
+                      <a:prstDash val="solid"/>
+                    </a:lnTlToBr>
+                    <a:lnBlToTr w="12700" cmpd="sng">
+                      <a:noFill/>
+                      <a:prstDash val="solid"/>
+                    </a:lnBlToTr>
+                    <a:noFill/>
+                  </a:tcPr>
+                </a:tc>
+                <a:extLst>
+                  <a:ext uri="{0D108BD9-81ED-4DB2-BD59-A6C34878D82A}">
+                    <a16:rowId xmlns:a16="http://schemas.microsoft.com/office/drawing/2014/main" val="2219228106"/>
+                  </a:ext>
+                </a:extLst>
+              </a:tr>
+            </a:tbl>
+          </a:graphicData>
+        </a:graphic>
+      </p:graphicFrame>
+      <p:graphicFrame>
+        <p:nvGraphicFramePr>
+          <p:cNvPr id="5" name="Table 4">
+            <a:extLst>
+              <a:ext uri="{FF2B5EF4-FFF2-40B4-BE49-F238E27FC236}">
+                <a16:creationId xmlns:a16="http://schemas.microsoft.com/office/drawing/2014/main" id="{31E41D14-8E88-1989-E777-86B78FF6006F}"/>
+              </a:ext>
+            </a:extLst>
+          </p:cNvPr>
+          <p:cNvGraphicFramePr>
+            <a:graphicFrameLocks noGrp="1"/>
+          </p:cNvGraphicFramePr>
+          <p:nvPr>
+            <p:extLst>
+              <p:ext uri="{D42A27DB-BD31-4B8C-83A1-F6EECF244321}">
+                <p14:modId xmlns:p14="http://schemas.microsoft.com/office/powerpoint/2010/main" val="2938814209"/>
+              </p:ext>
+            </p:extLst>
+          </p:nvPr>
+        </p:nvGraphicFramePr>
+        <p:xfrm>
+          <a:off x="5486400" y="5616505"/>
+          <a:ext cx="3390900" cy="937260"/>
+        </p:xfrm>
+        <a:graphic>
+          <a:graphicData uri="http://schemas.openxmlformats.org/drawingml/2006/table">
+            <a:tbl>
+              <a:tblPr/>
+              <a:tblGrid>
+                <a:gridCol w="2438400">
+                  <a:extLst>
+                    <a:ext uri="{9D8B030D-6E8A-4147-A177-3AD203B41FA5}">
+                      <a16:colId xmlns:a16="http://schemas.microsoft.com/office/drawing/2014/main" val="3895153416"/>
+                    </a:ext>
+                  </a:extLst>
+                </a:gridCol>
+                <a:gridCol w="952500">
+                  <a:extLst>
+                    <a:ext uri="{9D8B030D-6E8A-4147-A177-3AD203B41FA5}">
+                      <a16:colId xmlns:a16="http://schemas.microsoft.com/office/drawing/2014/main" val="835836034"/>
+                    </a:ext>
+                  </a:extLst>
+                </a:gridCol>
+              </a:tblGrid>
+              <a:tr h="200025">
+                <a:tc>
+                  <a:txBody>
+                    <a:bodyPr/>
+                    <a:lstStyle/>
+                    <a:p>
+                      <a:pPr rtl="0" fontAlgn="b"/>
+                      <a:r>
+                        <a:rPr lang="en-US" b="1">
+                          <a:effectLst/>
+                        </a:rPr>
+                        <a:t>Assignmment total</a:t>
+                      </a:r>
+                    </a:p>
+                  </a:txBody>
+                  <a:tcPr marL="28575" marR="28575" marT="19050" marB="19050" anchor="b">
+                    <a:lnL w="12700" cap="flat" cmpd="sng" algn="ctr">
+                      <a:solidFill>
+                        <a:schemeClr val="tx1"/>
+                      </a:solidFill>
+                      <a:prstDash val="solid"/>
+                      <a:round/>
+                      <a:headEnd type="none" w="med" len="med"/>
+                      <a:tailEnd type="none" w="med" len="med"/>
+                    </a:lnL>
+                    <a:lnR w="9525" cap="flat" cmpd="sng" algn="ctr">
+                      <a:noFill/>
+                      <a:prstDash val="solid"/>
+                      <a:round/>
+                      <a:headEnd type="none" w="med" len="med"/>
+                      <a:tailEnd type="none" w="med" len="med"/>
+                    </a:lnR>
+                    <a:lnT w="12700" cap="flat" cmpd="sng" algn="ctr">
+                      <a:solidFill>
+                        <a:schemeClr val="tx1"/>
+                      </a:solidFill>
+                      <a:prstDash val="solid"/>
+                      <a:round/>
+                      <a:headEnd type="none" w="med" len="med"/>
+                      <a:tailEnd type="none" w="med" len="med"/>
+                    </a:lnT>
+                    <a:lnB w="9525" cap="flat" cmpd="sng" algn="ctr">
+                      <a:noFill/>
+                      <a:prstDash val="solid"/>
+                      <a:round/>
+                      <a:headEnd type="none" w="med" len="med"/>
+                      <a:tailEnd type="none" w="med" len="med"/>
+                    </a:lnB>
+                    <a:lnTlToBr w="12700" cmpd="sng">
+                      <a:noFill/>
+                      <a:prstDash val="solid"/>
+                    </a:lnTlToBr>
+                    <a:lnBlToTr w="12700" cmpd="sng">
+                      <a:noFill/>
+                      <a:prstDash val="solid"/>
+                    </a:lnBlToTr>
+                    <a:noFill/>
+                  </a:tcPr>
+                </a:tc>
+                <a:tc>
+                  <a:txBody>
+                    <a:bodyPr/>
+                    <a:lstStyle/>
+                    <a:p>
+                      <a:pPr algn="r" rtl="0" fontAlgn="b"/>
+                      <a:r>
+                        <a:rPr lang="en-US" b="1">
+                          <a:effectLst/>
+                        </a:rPr>
+                        <a:t>900</a:t>
+                      </a:r>
+                    </a:p>
+                  </a:txBody>
+                  <a:tcPr marL="28575" marR="28575" marT="19050" marB="19050" anchor="b">
+                    <a:lnL w="9525" cap="flat" cmpd="sng" algn="ctr">
+                      <a:noFill/>
+                      <a:prstDash val="solid"/>
+                      <a:round/>
+                      <a:headEnd type="none" w="med" len="med"/>
+                      <a:tailEnd type="none" w="med" len="med"/>
+                    </a:lnL>
+                    <a:lnR w="12700" cap="flat" cmpd="sng" algn="ctr">
+                      <a:solidFill>
+                        <a:schemeClr val="tx1"/>
+                      </a:solidFill>
+                      <a:prstDash val="solid"/>
+                      <a:round/>
+                      <a:headEnd type="none" w="med" len="med"/>
+                      <a:tailEnd type="none" w="med" len="med"/>
+                    </a:lnR>
+                    <a:lnT w="12700" cap="flat" cmpd="sng" algn="ctr">
+                      <a:solidFill>
+                        <a:schemeClr val="tx1"/>
+                      </a:solidFill>
+                      <a:prstDash val="solid"/>
+                      <a:round/>
+                      <a:headEnd type="none" w="med" len="med"/>
+                      <a:tailEnd type="none" w="med" len="med"/>
+                    </a:lnT>
+                    <a:lnB w="9525" cap="flat" cmpd="sng" algn="ctr">
+                      <a:noFill/>
+                      <a:prstDash val="solid"/>
+                      <a:round/>
+                      <a:headEnd type="none" w="med" len="med"/>
+                      <a:tailEnd type="none" w="med" len="med"/>
+                    </a:lnB>
+                    <a:lnTlToBr w="12700" cmpd="sng">
+                      <a:noFill/>
+                      <a:prstDash val="solid"/>
+                    </a:lnTlToBr>
+                    <a:lnBlToTr w="12700" cmpd="sng">
+                      <a:noFill/>
+                      <a:prstDash val="solid"/>
+                    </a:lnBlToTr>
+                    <a:noFill/>
+                  </a:tcPr>
+                </a:tc>
+                <a:extLst>
+                  <a:ext uri="{0D108BD9-81ED-4DB2-BD59-A6C34878D82A}">
+                    <a16:rowId xmlns:a16="http://schemas.microsoft.com/office/drawing/2014/main" val="2383055498"/>
+                  </a:ext>
+                </a:extLst>
+              </a:tr>
+              <a:tr h="200025">
+                <a:tc>
+                  <a:txBody>
+                    <a:bodyPr/>
+                    <a:lstStyle/>
+                    <a:p>
+                      <a:pPr rtl="0" fontAlgn="b"/>
+                      <a:r>
+                        <a:rPr lang="en-US" dirty="0">
+                          <a:effectLst/>
+                        </a:rPr>
+                        <a:t>Participation</a:t>
+                      </a:r>
+                    </a:p>
+                  </a:txBody>
+                  <a:tcPr marL="28575" marR="28575" marT="19050" marB="19050" anchor="b">
+                    <a:lnL w="12700" cap="flat" cmpd="sng" algn="ctr">
+                      <a:solidFill>
+                        <a:schemeClr val="tx1"/>
+                      </a:solidFill>
+                      <a:prstDash val="solid"/>
+                      <a:round/>
+                      <a:headEnd type="none" w="med" len="med"/>
+                      <a:tailEnd type="none" w="med" len="med"/>
+                    </a:lnL>
+                    <a:lnR w="9525" cap="flat" cmpd="sng" algn="ctr">
+                      <a:noFill/>
+                      <a:prstDash val="solid"/>
+                      <a:round/>
+                      <a:headEnd type="none" w="med" len="med"/>
+                      <a:tailEnd type="none" w="med" len="med"/>
+                    </a:lnR>
+                    <a:lnT w="9525" cap="flat" cmpd="sng" algn="ctr">
+                      <a:noFill/>
+                      <a:prstDash val="solid"/>
+                      <a:round/>
+                      <a:headEnd type="none" w="med" len="med"/>
+                      <a:tailEnd type="none" w="med" len="med"/>
+                    </a:lnT>
+                    <a:lnB w="9525" cap="flat" cmpd="sng" algn="ctr">
+                      <a:noFill/>
+                      <a:prstDash val="solid"/>
+                      <a:round/>
+                      <a:headEnd type="none" w="med" len="med"/>
+                      <a:tailEnd type="none" w="med" len="med"/>
+                    </a:lnB>
+                    <a:lnTlToBr w="12700" cmpd="sng">
+                      <a:noFill/>
+                      <a:prstDash val="solid"/>
+                    </a:lnTlToBr>
+                    <a:lnBlToTr w="12700" cmpd="sng">
+                      <a:noFill/>
+                      <a:prstDash val="solid"/>
+                    </a:lnBlToTr>
+                    <a:noFill/>
+                  </a:tcPr>
+                </a:tc>
+                <a:tc>
+                  <a:txBody>
+                    <a:bodyPr/>
+                    <a:lstStyle/>
+                    <a:p>
+                      <a:pPr algn="r" rtl="0" fontAlgn="b"/>
+                      <a:r>
+                        <a:rPr lang="en-US">
+                          <a:effectLst/>
+                        </a:rPr>
+                        <a:t>100</a:t>
+                      </a:r>
+                    </a:p>
+                  </a:txBody>
+                  <a:tcPr marL="28575" marR="28575" marT="19050" marB="19050" anchor="b">
+                    <a:lnL w="9525" cap="flat" cmpd="sng" algn="ctr">
+                      <a:noFill/>
+                      <a:prstDash val="solid"/>
+                      <a:round/>
+                      <a:headEnd type="none" w="med" len="med"/>
+                      <a:tailEnd type="none" w="med" len="med"/>
+                    </a:lnL>
+                    <a:lnR w="12700" cap="flat" cmpd="sng" algn="ctr">
+                      <a:solidFill>
+                        <a:schemeClr val="tx1"/>
+                      </a:solidFill>
+                      <a:prstDash val="solid"/>
+                      <a:round/>
+                      <a:headEnd type="none" w="med" len="med"/>
+                      <a:tailEnd type="none" w="med" len="med"/>
+                    </a:lnR>
+                    <a:lnT w="9525" cap="flat" cmpd="sng" algn="ctr">
+                      <a:noFill/>
+                      <a:prstDash val="solid"/>
+                      <a:round/>
+                      <a:headEnd type="none" w="med" len="med"/>
+                      <a:tailEnd type="none" w="med" len="med"/>
+                    </a:lnT>
+                    <a:lnB w="9525" cap="flat" cmpd="sng" algn="ctr">
+                      <a:noFill/>
+                      <a:prstDash val="solid"/>
+                      <a:round/>
+                      <a:headEnd type="none" w="med" len="med"/>
+                      <a:tailEnd type="none" w="med" len="med"/>
+                    </a:lnB>
+                    <a:lnTlToBr w="12700" cmpd="sng">
+                      <a:noFill/>
+                      <a:prstDash val="solid"/>
+                    </a:lnTlToBr>
+                    <a:lnBlToTr w="12700" cmpd="sng">
+                      <a:noFill/>
+                      <a:prstDash val="solid"/>
+                    </a:lnBlToTr>
+                    <a:noFill/>
+                  </a:tcPr>
+                </a:tc>
+                <a:extLst>
+                  <a:ext uri="{0D108BD9-81ED-4DB2-BD59-A6C34878D82A}">
+                    <a16:rowId xmlns:a16="http://schemas.microsoft.com/office/drawing/2014/main" val="2622741706"/>
+                  </a:ext>
+                </a:extLst>
+              </a:tr>
+              <a:tr h="200025">
+                <a:tc>
+                  <a:txBody>
+                    <a:bodyPr/>
+                    <a:lstStyle/>
+                    <a:p>
+                      <a:pPr rtl="0" fontAlgn="b"/>
+                      <a:r>
+                        <a:rPr lang="en-US" dirty="0">
+                          <a:effectLst/>
+                        </a:rPr>
+                        <a:t>TOTAL</a:t>
+                      </a:r>
+                    </a:p>
+                  </a:txBody>
+                  <a:tcPr marL="28575" marR="28575" marT="19050" marB="19050" anchor="b">
+                    <a:lnL w="12700" cap="flat" cmpd="sng" algn="ctr">
+                      <a:solidFill>
+                        <a:schemeClr val="tx1"/>
+                      </a:solidFill>
+                      <a:prstDash val="solid"/>
+                      <a:round/>
+                      <a:headEnd type="none" w="med" len="med"/>
+                      <a:tailEnd type="none" w="med" len="med"/>
+                    </a:lnL>
+                    <a:lnR w="9525" cap="flat" cmpd="sng" algn="ctr">
+                      <a:noFill/>
+                      <a:prstDash val="solid"/>
+                      <a:round/>
+                      <a:headEnd type="none" w="med" len="med"/>
+                      <a:tailEnd type="none" w="med" len="med"/>
+                    </a:lnR>
+                    <a:lnT w="9525" cap="flat" cmpd="sng" algn="ctr">
+                      <a:noFill/>
+                      <a:prstDash val="solid"/>
+                      <a:round/>
+                      <a:headEnd type="none" w="med" len="med"/>
+                      <a:tailEnd type="none" w="med" len="med"/>
+                    </a:lnT>
+                    <a:lnB w="12700" cap="flat" cmpd="sng" algn="ctr">
+                      <a:solidFill>
+                        <a:schemeClr val="tx1"/>
+                      </a:solidFill>
+                      <a:prstDash val="solid"/>
+                      <a:round/>
+                      <a:headEnd type="none" w="med" len="med"/>
+                      <a:tailEnd type="none" w="med" len="med"/>
+                    </a:lnB>
+                    <a:lnTlToBr w="12700" cmpd="sng">
+                      <a:noFill/>
+                      <a:prstDash val="solid"/>
+                    </a:lnTlToBr>
+                    <a:lnBlToTr w="12700" cmpd="sng">
+                      <a:noFill/>
+                      <a:prstDash val="solid"/>
+                    </a:lnBlToTr>
+                    <a:noFill/>
+                  </a:tcPr>
+                </a:tc>
+                <a:tc>
+                  <a:txBody>
+                    <a:bodyPr/>
+                    <a:lstStyle/>
+                    <a:p>
+                      <a:pPr algn="r" rtl="0" fontAlgn="b"/>
+                      <a:r>
+                        <a:rPr lang="en-US" dirty="0">
+                          <a:effectLst/>
+                        </a:rPr>
+                        <a:t>1000</a:t>
+                      </a:r>
+                    </a:p>
+                  </a:txBody>
+                  <a:tcPr marL="28575" marR="28575" marT="19050" marB="19050" anchor="b">
+                    <a:lnL w="9525" cap="flat" cmpd="sng" algn="ctr">
+                      <a:noFill/>
+                      <a:prstDash val="solid"/>
+                      <a:round/>
+                      <a:headEnd type="none" w="med" len="med"/>
+                      <a:tailEnd type="none" w="med" len="med"/>
+                    </a:lnL>
+                    <a:lnR w="12700" cap="flat" cmpd="sng" algn="ctr">
+                      <a:solidFill>
+                        <a:schemeClr val="tx1"/>
+                      </a:solidFill>
+                      <a:prstDash val="solid"/>
+                      <a:round/>
+                      <a:headEnd type="none" w="med" len="med"/>
+                      <a:tailEnd type="none" w="med" len="med"/>
+                    </a:lnR>
+                    <a:lnT w="9525" cap="flat" cmpd="sng" algn="ctr">
+                      <a:noFill/>
+                      <a:prstDash val="solid"/>
+                      <a:round/>
+                      <a:headEnd type="none" w="med" len="med"/>
+                      <a:tailEnd type="none" w="med" len="med"/>
+                    </a:lnT>
+                    <a:lnB w="12700" cap="flat" cmpd="sng" algn="ctr">
+                      <a:solidFill>
+                        <a:schemeClr val="tx1"/>
+                      </a:solidFill>
+                      <a:prstDash val="solid"/>
+                      <a:round/>
+                      <a:headEnd type="none" w="med" len="med"/>
+                      <a:tailEnd type="none" w="med" len="med"/>
+                    </a:lnB>
+                    <a:lnTlToBr w="12700" cmpd="sng">
+                      <a:noFill/>
+                      <a:prstDash val="solid"/>
+                    </a:lnTlToBr>
+                    <a:lnBlToTr w="12700" cmpd="sng">
+                      <a:noFill/>
+                      <a:prstDash val="solid"/>
+                    </a:lnBlToTr>
+                    <a:noFill/>
+                  </a:tcPr>
+                </a:tc>
+                <a:extLst>
+                  <a:ext uri="{0D108BD9-81ED-4DB2-BD59-A6C34878D82A}">
+                    <a16:rowId xmlns:a16="http://schemas.microsoft.com/office/drawing/2014/main" val="1400235187"/>
+                  </a:ext>
+                </a:extLst>
+              </a:tr>
+            </a:tbl>
+          </a:graphicData>
+        </a:graphic>
+      </p:graphicFrame>
       <p:sp>
         <p:nvSpPr>
-          <p:cNvPr id="3" name="Content Placeholder 2">
-            <a:extLst>
-              <a:ext uri="{FF2B5EF4-FFF2-40B4-BE49-F238E27FC236}">
-                <a16:creationId xmlns:a16="http://schemas.microsoft.com/office/drawing/2014/main" id="{C85F1BE2-9AFE-698D-FF46-095969922792}"/>
-              </a:ext>
-            </a:extLst>
-          </p:cNvPr>
-          <p:cNvSpPr>
-            <a:spLocks noGrp="1"/>
-          </p:cNvSpPr>
-          <p:nvPr>
-            <p:ph idx="1"/>
-          </p:nvPr>
+          <p:cNvPr id="6" name="TextBox 5">
+            <a:extLst>
+              <a:ext uri="{FF2B5EF4-FFF2-40B4-BE49-F238E27FC236}">
+                <a16:creationId xmlns:a16="http://schemas.microsoft.com/office/drawing/2014/main" id="{8604BBA6-5976-78DF-D6A6-5F7224D79B41}"/>
+              </a:ext>
+            </a:extLst>
+          </p:cNvPr>
+          <p:cNvSpPr txBox="1"/>
+          <p:nvPr/>
         </p:nvSpPr>
-        <p:spPr/>
+        <p:spPr>
+          <a:xfrm>
+            <a:off x="533400" y="1662979"/>
+            <a:ext cx="3810000" cy="461665"/>
+          </a:xfrm>
+          <a:prstGeom prst="rect">
+            <a:avLst/>
+          </a:prstGeom>
+          <a:noFill/>
+        </p:spPr>
         <p:txBody>
-          <a:bodyPr/>
+          <a:bodyPr wrap="square" rtlCol="0">
+            <a:spAutoFit/>
+          </a:bodyPr>
           <a:lstStyle/>
           <a:p>
-            <a:pPr marL="0" indent="0">
-              <a:buNone/>
-            </a:pPr>
-            <a:r>
-              <a:rPr lang="en-US" i="1" dirty="0"/>
-              <a:t>Materials (written or otherwise) submitted to fulfill academic requirements must represent a student’s efforts unless otherwise permitted by an instructor    </a:t>
-            </a:r>
-            <a:r>
-              <a:rPr lang="en-US" sz="2000" dirty="0">
-                <a:hlinkClick r:id="rId2"/>
-              </a:rPr>
-              <a:t>Student Guide to Academic Integrity</a:t>
-            </a:r>
-            <a:br>
-              <a:rPr lang="en-US" sz="2000" dirty="0"/>
-            </a:br>
-            <a:endParaRPr lang="en-US" sz="2000" i="1" dirty="0"/>
-          </a:p>
-          <a:p>
-            <a:r>
-              <a:rPr lang="en-US" dirty="0"/>
-              <a:t>Disclaim the use of any coding assistant or LLMs (such as ChatGPT) </a:t>
-            </a:r>
-          </a:p>
-          <a:p>
-            <a:r>
-              <a:rPr lang="en-US" dirty="0"/>
-              <a:t>Understand every line of code that is submitted as part of the assignments</a:t>
-            </a:r>
-          </a:p>
-          <a:p>
-            <a:pPr marL="0" indent="0">
-              <a:buNone/>
-            </a:pPr>
-            <a:r>
-              <a:rPr lang="en-US" b="1" i="1" dirty="0"/>
-              <a:t> =&gt; refrain from the use of AI tools and keep to practicing your skills and favoring peer-to-peer learning</a:t>
+            <a:r>
+              <a:rPr lang="en-US" sz="2400" i="1" baseline="30000" dirty="0"/>
+              <a:t>* </a:t>
+            </a:r>
+            <a:r>
+              <a:rPr lang="en-US" sz="2400" i="1" dirty="0"/>
+              <a:t>Subject to slight changes </a:t>
             </a:r>
           </a:p>
         </p:txBody>
@@ -5448,7 +8550,7 @@
     </p:spTree>
     <p:extLst>
       <p:ext uri="{BB962C8B-B14F-4D97-AF65-F5344CB8AC3E}">
-        <p14:creationId xmlns:p14="http://schemas.microsoft.com/office/powerpoint/2010/main" val="4291811760"/>
+        <p14:creationId xmlns:p14="http://schemas.microsoft.com/office/powerpoint/2010/main" val="1685981324"/>
       </p:ext>
     </p:extLst>
   </p:cSld>

</xml_diff>